<commit_message>
meeting summary pipeline: update flow for mail service
Signed-off-by: Lu Ken <ken.lu@intel.com>
</commit_message>
<xml_diff>
--- a/docs/enterprise_ai.pptx
+++ b/docs/enterprise_ai.pptx
@@ -5037,126 +5037,23 @@
           <a:p>
             <a:pPr algn="ctr"/>
             <a:r>
-              <a:rPr lang="en-US" sz="1400">
+              <a:rPr lang="en-US" altLang="zh-CN" sz="1400" dirty="0">
                 <a:solidFill>
                   <a:schemeClr val="tx1"/>
                 </a:solidFill>
                 <a:cs typeface="+mn-lt"/>
               </a:rPr>
-              <a:t>TTS (Text To Speech) Service</a:t>
-            </a:r>
-          </a:p>
-        </p:txBody>
-      </p:sp>
-      <p:sp>
-        <p:nvSpPr>
-          <p:cNvPr id="10" name="Rounded Rectangle 14">
-            <a:extLst>
-              <a:ext uri="{FF2B5EF4-FFF2-40B4-BE49-F238E27FC236}">
-                <a16:creationId xmlns:a16="http://schemas.microsoft.com/office/drawing/2014/main" id="{3AD1FDB7-6061-6AB7-F1E5-82B04AAE75BB}"/>
-              </a:ext>
-            </a:extLst>
-          </p:cNvPr>
-          <p:cNvSpPr/>
-          <p:nvPr/>
-        </p:nvSpPr>
-        <p:spPr>
-          <a:xfrm>
-            <a:off x="9554918" y="1901598"/>
-            <a:ext cx="1778830" cy="850768"/>
-          </a:xfrm>
-          <a:prstGeom prst="roundRect">
-            <a:avLst>
-              <a:gd name="adj" fmla="val 9970"/>
-            </a:avLst>
-          </a:prstGeom>
-          <a:noFill/>
-          <a:extLst>
-            <a:ext uri="{909E8E84-426E-40DD-AFC4-6F175D3DCCD1}">
-              <a14:hiddenFill xmlns:a14="http://schemas.microsoft.com/office/drawing/2010/main">
-                <a:solidFill>
-                  <a:schemeClr val="accent1"/>
-                </a:solidFill>
-              </a14:hiddenFill>
-            </a:ext>
-          </a:extLst>
-        </p:spPr>
-        <p:style>
-          <a:lnRef idx="2">
-            <a:schemeClr val="accent1">
-              <a:shade val="50000"/>
-            </a:schemeClr>
-          </a:lnRef>
-          <a:fillRef idx="1">
-            <a:schemeClr val="accent1"/>
-          </a:fillRef>
-          <a:effectRef idx="0">
-            <a:schemeClr val="accent1"/>
-          </a:effectRef>
-          <a:fontRef idx="minor">
-            <a:schemeClr val="lt1"/>
-          </a:fontRef>
-        </p:style>
-        <p:txBody>
-          <a:bodyPr rtlCol="0" anchor="ctr"/>
-          <a:lstStyle/>
-          <a:p>
-            <a:pPr algn="ctr"/>
-            <a:r>
-              <a:rPr lang="en-US" sz="1400">
+              <a:t>Mail </a:t>
+            </a:r>
+            <a:r>
+              <a:rPr lang="en-US" sz="1400" dirty="0">
                 <a:solidFill>
                   <a:schemeClr val="tx1"/>
                 </a:solidFill>
-                <a:hlinkClick r:id="rId2" action="ppaction://hlinkfile"/>
+                <a:cs typeface="+mn-lt"/>
               </a:rPr>
-              <a:t>OpenAI Transcriptions API</a:t>
-            </a:r>
-          </a:p>
-        </p:txBody>
-      </p:sp>
-      <p:sp>
-        <p:nvSpPr>
-          <p:cNvPr id="11" name="Up Arrow 16">
-            <a:extLst>
-              <a:ext uri="{FF2B5EF4-FFF2-40B4-BE49-F238E27FC236}">
-                <a16:creationId xmlns:a16="http://schemas.microsoft.com/office/drawing/2014/main" id="{E12493C4-FFE2-D613-8D28-ABD2F8C2E727}"/>
-              </a:ext>
-            </a:extLst>
-          </p:cNvPr>
-          <p:cNvSpPr/>
-          <p:nvPr/>
-        </p:nvSpPr>
-        <p:spPr>
-          <a:xfrm>
-            <a:off x="10187422" y="2838304"/>
-            <a:ext cx="634115" cy="131558"/>
-          </a:xfrm>
-          <a:prstGeom prst="upArrow">
-            <a:avLst/>
-          </a:prstGeom>
-        </p:spPr>
-        <p:style>
-          <a:lnRef idx="2">
-            <a:schemeClr val="dk1">
-              <a:shade val="50000"/>
-            </a:schemeClr>
-          </a:lnRef>
-          <a:fillRef idx="1">
-            <a:schemeClr val="dk1"/>
-          </a:fillRef>
-          <a:effectRef idx="0">
-            <a:schemeClr val="dk1"/>
-          </a:effectRef>
-          <a:fontRef idx="minor">
-            <a:schemeClr val="lt1"/>
-          </a:fontRef>
-        </p:style>
-        <p:txBody>
-          <a:bodyPr rtlCol="0" anchor="ctr"/>
-          <a:lstStyle/>
-          <a:p>
-            <a:pPr algn="ctr"/>
-            <a:endParaRPr lang="en-US" sz="1400"/>
+              <a:t>Service</a:t>
+            </a:r>
           </a:p>
         </p:txBody>
       </p:sp>

</xml_diff>

<commit_message>
README.md: add API gateway
Signed-off-by: Lu Ken <ken.lu@intel.com>
</commit_message>
<xml_diff>
--- a/docs/enterprise_ai.pptx
+++ b/docs/enterprise_ai.pptx
@@ -3570,6 +3570,63 @@
       </p:grpSpPr>
       <p:sp>
         <p:nvSpPr>
+          <p:cNvPr id="14" name="Rectangles 3">
+            <a:extLst>
+              <a:ext uri="{FF2B5EF4-FFF2-40B4-BE49-F238E27FC236}">
+                <a16:creationId xmlns:a16="http://schemas.microsoft.com/office/drawing/2014/main" id="{E3D278C7-3FA1-4AC0-8BE9-BFF9079C9A06}"/>
+              </a:ext>
+            </a:extLst>
+          </p:cNvPr>
+          <p:cNvSpPr/>
+          <p:nvPr/>
+        </p:nvSpPr>
+        <p:spPr>
+          <a:xfrm>
+            <a:off x="2910674" y="1767713"/>
+            <a:ext cx="8421959" cy="1065849"/>
+          </a:xfrm>
+          <a:prstGeom prst="rect">
+            <a:avLst/>
+          </a:prstGeom>
+          <a:solidFill>
+            <a:schemeClr val="accent1">
+              <a:lumMod val="20000"/>
+              <a:lumOff val="80000"/>
+            </a:schemeClr>
+          </a:solidFill>
+        </p:spPr>
+        <p:style>
+          <a:lnRef idx="2">
+            <a:schemeClr val="accent1">
+              <a:shade val="50000"/>
+            </a:schemeClr>
+          </a:lnRef>
+          <a:fillRef idx="1">
+            <a:schemeClr val="accent1"/>
+          </a:fillRef>
+          <a:effectRef idx="0">
+            <a:schemeClr val="accent1"/>
+          </a:effectRef>
+          <a:fontRef idx="minor">
+            <a:schemeClr val="lt1"/>
+          </a:fontRef>
+        </p:style>
+        <p:txBody>
+          <a:bodyPr rtlCol="0" anchor="ctr"/>
+          <a:lstStyle/>
+          <a:p>
+            <a:pPr algn="ctr"/>
+            <a:endParaRPr lang="en-US" sz="1400" dirty="0">
+              <a:solidFill>
+                <a:schemeClr val="tx1"/>
+              </a:solidFill>
+              <a:cs typeface="+mn-lt"/>
+            </a:endParaRPr>
+          </a:p>
+        </p:txBody>
+      </p:sp>
+      <p:sp>
+        <p:nvSpPr>
           <p:cNvPr id="2" name="Title 1"/>
           <p:cNvSpPr>
             <a:spLocks noGrp="1"/>
@@ -3584,18 +3641,676 @@
           <a:lstStyle/>
           <a:p>
             <a:r>
-              <a:rPr lang="en-US"/>
-              <a:t>ChatBot Pipeline</a:t>
-            </a:r>
+              <a:rPr lang="en-US" dirty="0" err="1"/>
+              <a:t>ChatBot</a:t>
+            </a:r>
+            <a:r>
+              <a:rPr lang="en-US" dirty="0"/>
+              <a:t> Pipeline</a:t>
+            </a:r>
+          </a:p>
+        </p:txBody>
+      </p:sp>
+      <p:sp>
+        <p:nvSpPr>
+          <p:cNvPr id="26" name="Rectangles 25"/>
+          <p:cNvSpPr/>
+          <p:nvPr/>
+        </p:nvSpPr>
+        <p:spPr>
+          <a:xfrm>
+            <a:off x="2910674" y="4034543"/>
+            <a:ext cx="8423074" cy="866320"/>
+          </a:xfrm>
+          <a:prstGeom prst="rect">
+            <a:avLst/>
+          </a:prstGeom>
+          <a:solidFill>
+            <a:schemeClr val="accent1">
+              <a:lumMod val="20000"/>
+              <a:lumOff val="80000"/>
+            </a:schemeClr>
+          </a:solidFill>
+        </p:spPr>
+        <p:style>
+          <a:lnRef idx="2">
+            <a:schemeClr val="accent1">
+              <a:shade val="50000"/>
+            </a:schemeClr>
+          </a:lnRef>
+          <a:fillRef idx="1">
+            <a:schemeClr val="accent1"/>
+          </a:fillRef>
+          <a:effectRef idx="0">
+            <a:schemeClr val="accent1"/>
+          </a:effectRef>
+          <a:fontRef idx="minor">
+            <a:schemeClr val="lt1"/>
+          </a:fontRef>
+        </p:style>
+        <p:txBody>
+          <a:bodyPr rtlCol="0" anchor="ctr"/>
+          <a:lstStyle/>
+          <a:p>
+            <a:pPr algn="ctr"/>
+            <a:endParaRPr lang="en-US" sz="1400"/>
+          </a:p>
+        </p:txBody>
+      </p:sp>
+      <p:sp>
+        <p:nvSpPr>
+          <p:cNvPr id="4" name="Rectangles 3"/>
+          <p:cNvSpPr/>
+          <p:nvPr/>
+        </p:nvSpPr>
+        <p:spPr>
+          <a:xfrm>
+            <a:off x="3084094" y="3098731"/>
+            <a:ext cx="2231977" cy="748753"/>
+          </a:xfrm>
+          <a:prstGeom prst="rect">
+            <a:avLst/>
+          </a:prstGeom>
+          <a:solidFill>
+            <a:schemeClr val="accent1">
+              <a:lumMod val="20000"/>
+              <a:lumOff val="80000"/>
+            </a:schemeClr>
+          </a:solidFill>
+        </p:spPr>
+        <p:style>
+          <a:lnRef idx="2">
+            <a:schemeClr val="accent1">
+              <a:shade val="50000"/>
+            </a:schemeClr>
+          </a:lnRef>
+          <a:fillRef idx="1">
+            <a:schemeClr val="accent1"/>
+          </a:fillRef>
+          <a:effectRef idx="0">
+            <a:schemeClr val="accent1"/>
+          </a:effectRef>
+          <a:fontRef idx="minor">
+            <a:schemeClr val="lt1"/>
+          </a:fontRef>
+        </p:style>
+        <p:txBody>
+          <a:bodyPr rtlCol="0" anchor="ctr"/>
+          <a:lstStyle/>
+          <a:p>
+            <a:pPr algn="ctr"/>
+            <a:r>
+              <a:rPr lang="en-US" sz="1400" dirty="0">
+                <a:solidFill>
+                  <a:schemeClr val="tx1"/>
+                </a:solidFill>
+                <a:cs typeface="+mn-lt"/>
+              </a:rPr>
+              <a:t>ASR(Auto Speech Recognition) Service</a:t>
+            </a:r>
+          </a:p>
+        </p:txBody>
+      </p:sp>
+      <p:sp>
+        <p:nvSpPr>
+          <p:cNvPr id="9" name="Rounded Rectangle 8"/>
+          <p:cNvSpPr/>
+          <p:nvPr/>
+        </p:nvSpPr>
+        <p:spPr>
+          <a:xfrm>
+            <a:off x="3501166" y="2198871"/>
+            <a:ext cx="1320654" cy="493858"/>
+          </a:xfrm>
+          <a:prstGeom prst="roundRect">
+            <a:avLst/>
+          </a:prstGeom>
+          <a:solidFill>
+            <a:schemeClr val="accent1">
+              <a:lumMod val="40000"/>
+              <a:lumOff val="60000"/>
+            </a:schemeClr>
+          </a:solidFill>
+        </p:spPr>
+        <p:style>
+          <a:lnRef idx="2">
+            <a:schemeClr val="accent1">
+              <a:shade val="50000"/>
+            </a:schemeClr>
+          </a:lnRef>
+          <a:fillRef idx="1">
+            <a:schemeClr val="accent1"/>
+          </a:fillRef>
+          <a:effectRef idx="0">
+            <a:schemeClr val="accent1"/>
+          </a:effectRef>
+          <a:fontRef idx="minor">
+            <a:schemeClr val="lt1"/>
+          </a:fontRef>
+        </p:style>
+        <p:txBody>
+          <a:bodyPr rtlCol="0" anchor="ctr"/>
+          <a:lstStyle/>
+          <a:p>
+            <a:pPr algn="ctr"/>
+            <a:r>
+              <a:rPr lang="en-US" sz="1200" dirty="0">
+                <a:solidFill>
+                  <a:schemeClr val="tx1"/>
+                </a:solidFill>
+                <a:hlinkClick r:id="rId2" action="ppaction://hlinkfile"/>
+              </a:rPr>
+              <a:t>OpenAI Speech API</a:t>
+            </a:r>
+          </a:p>
+        </p:txBody>
+      </p:sp>
+      <p:sp>
+        <p:nvSpPr>
+          <p:cNvPr id="11" name="Up Arrow 10"/>
+          <p:cNvSpPr/>
+          <p:nvPr/>
+        </p:nvSpPr>
+        <p:spPr>
+          <a:xfrm>
+            <a:off x="3801892" y="2723147"/>
+            <a:ext cx="634115" cy="258928"/>
+          </a:xfrm>
+          <a:prstGeom prst="upArrow">
+            <a:avLst/>
+          </a:prstGeom>
+          <a:solidFill>
+            <a:schemeClr val="tx1">
+              <a:lumMod val="65000"/>
+              <a:lumOff val="35000"/>
+            </a:schemeClr>
+          </a:solidFill>
+          <a:ln>
+            <a:noFill/>
+          </a:ln>
+        </p:spPr>
+        <p:style>
+          <a:lnRef idx="2">
+            <a:schemeClr val="dk1">
+              <a:shade val="50000"/>
+            </a:schemeClr>
+          </a:lnRef>
+          <a:fillRef idx="1">
+            <a:schemeClr val="dk1"/>
+          </a:fillRef>
+          <a:effectRef idx="0">
+            <a:schemeClr val="dk1"/>
+          </a:effectRef>
+          <a:fontRef idx="minor">
+            <a:schemeClr val="lt1"/>
+          </a:fontRef>
+        </p:style>
+        <p:txBody>
+          <a:bodyPr rtlCol="0" anchor="ctr"/>
+          <a:lstStyle/>
+          <a:p>
+            <a:pPr algn="ctr"/>
+            <a:endParaRPr lang="en-US" sz="1400"/>
+          </a:p>
+        </p:txBody>
+      </p:sp>
+      <p:sp>
+        <p:nvSpPr>
+          <p:cNvPr id="12" name="Rectangles 11"/>
+          <p:cNvSpPr/>
+          <p:nvPr/>
+        </p:nvSpPr>
+        <p:spPr>
+          <a:xfrm>
+            <a:off x="6095999" y="3098731"/>
+            <a:ext cx="2294021" cy="748753"/>
+          </a:xfrm>
+          <a:prstGeom prst="rect">
+            <a:avLst/>
+          </a:prstGeom>
+          <a:solidFill>
+            <a:schemeClr val="accent1">
+              <a:lumMod val="20000"/>
+              <a:lumOff val="80000"/>
+            </a:schemeClr>
+          </a:solidFill>
+        </p:spPr>
+        <p:style>
+          <a:lnRef idx="2">
+            <a:schemeClr val="accent1">
+              <a:shade val="50000"/>
+            </a:schemeClr>
+          </a:lnRef>
+          <a:fillRef idx="1">
+            <a:schemeClr val="accent1"/>
+          </a:fillRef>
+          <a:effectRef idx="0">
+            <a:schemeClr val="accent1"/>
+          </a:effectRef>
+          <a:fontRef idx="minor">
+            <a:schemeClr val="lt1"/>
+          </a:fontRef>
+        </p:style>
+        <p:txBody>
+          <a:bodyPr rtlCol="0" anchor="ctr"/>
+          <a:lstStyle/>
+          <a:p>
+            <a:pPr algn="ctr"/>
+            <a:r>
+              <a:rPr lang="en-US" sz="1400" dirty="0">
+                <a:solidFill>
+                  <a:schemeClr val="tx1"/>
+                </a:solidFill>
+                <a:cs typeface="+mn-lt"/>
+              </a:rPr>
+              <a:t>LLM Service</a:t>
+            </a:r>
+          </a:p>
+        </p:txBody>
+      </p:sp>
+      <p:sp>
+        <p:nvSpPr>
+          <p:cNvPr id="13" name="Rectangles 12"/>
+          <p:cNvSpPr/>
+          <p:nvPr/>
+        </p:nvSpPr>
+        <p:spPr>
+          <a:xfrm>
+            <a:off x="9091863" y="3098731"/>
+            <a:ext cx="2123200" cy="748753"/>
+          </a:xfrm>
+          <a:prstGeom prst="rect">
+            <a:avLst/>
+          </a:prstGeom>
+          <a:solidFill>
+            <a:schemeClr val="accent1">
+              <a:lumMod val="20000"/>
+              <a:lumOff val="80000"/>
+            </a:schemeClr>
+          </a:solidFill>
+        </p:spPr>
+        <p:style>
+          <a:lnRef idx="2">
+            <a:schemeClr val="accent1">
+              <a:shade val="50000"/>
+            </a:schemeClr>
+          </a:lnRef>
+          <a:fillRef idx="1">
+            <a:schemeClr val="accent1"/>
+          </a:fillRef>
+          <a:effectRef idx="0">
+            <a:schemeClr val="accent1"/>
+          </a:effectRef>
+          <a:fontRef idx="minor">
+            <a:schemeClr val="lt1"/>
+          </a:fontRef>
+        </p:style>
+        <p:txBody>
+          <a:bodyPr rtlCol="0" anchor="ctr"/>
+          <a:lstStyle/>
+          <a:p>
+            <a:pPr algn="ctr"/>
+            <a:r>
+              <a:rPr lang="en-US" sz="1400">
+                <a:solidFill>
+                  <a:schemeClr val="tx1"/>
+                </a:solidFill>
+                <a:cs typeface="+mn-lt"/>
+              </a:rPr>
+              <a:t>TTS (Text To Speech) Service</a:t>
+            </a:r>
+          </a:p>
+        </p:txBody>
+      </p:sp>
+      <p:sp>
+        <p:nvSpPr>
+          <p:cNvPr id="15" name="Rounded Rectangle 14"/>
+          <p:cNvSpPr/>
+          <p:nvPr/>
+        </p:nvSpPr>
+        <p:spPr>
+          <a:xfrm>
+            <a:off x="9091863" y="2198871"/>
+            <a:ext cx="2123200" cy="493858"/>
+          </a:xfrm>
+          <a:prstGeom prst="roundRect">
+            <a:avLst/>
+          </a:prstGeom>
+          <a:solidFill>
+            <a:schemeClr val="accent1">
+              <a:lumMod val="40000"/>
+              <a:lumOff val="60000"/>
+            </a:schemeClr>
+          </a:solidFill>
+        </p:spPr>
+        <p:style>
+          <a:lnRef idx="2">
+            <a:schemeClr val="accent1">
+              <a:shade val="50000"/>
+            </a:schemeClr>
+          </a:lnRef>
+          <a:fillRef idx="1">
+            <a:schemeClr val="accent1"/>
+          </a:fillRef>
+          <a:effectRef idx="0">
+            <a:schemeClr val="accent1"/>
+          </a:effectRef>
+          <a:fontRef idx="minor">
+            <a:schemeClr val="lt1"/>
+          </a:fontRef>
+        </p:style>
+        <p:txBody>
+          <a:bodyPr rtlCol="0" anchor="ctr"/>
+          <a:lstStyle/>
+          <a:p>
+            <a:pPr algn="ctr"/>
+            <a:r>
+              <a:rPr lang="en-US" sz="1200">
+                <a:solidFill>
+                  <a:schemeClr val="tx1"/>
+                </a:solidFill>
+                <a:hlinkClick r:id="rId2" action="ppaction://hlinkfile"/>
+              </a:rPr>
+              <a:t>OpenAI Transcriptions API</a:t>
+            </a:r>
+          </a:p>
+        </p:txBody>
+      </p:sp>
+      <p:sp>
+        <p:nvSpPr>
+          <p:cNvPr id="17" name="Up Arrow 16"/>
+          <p:cNvSpPr/>
+          <p:nvPr/>
+        </p:nvSpPr>
+        <p:spPr>
+          <a:xfrm>
+            <a:off x="9818454" y="2744633"/>
+            <a:ext cx="634115" cy="237442"/>
+          </a:xfrm>
+          <a:prstGeom prst="upArrow">
+            <a:avLst/>
+          </a:prstGeom>
+          <a:solidFill>
+            <a:schemeClr val="tx1">
+              <a:lumMod val="65000"/>
+              <a:lumOff val="35000"/>
+            </a:schemeClr>
+          </a:solidFill>
+          <a:ln>
+            <a:noFill/>
+          </a:ln>
+        </p:spPr>
+        <p:style>
+          <a:lnRef idx="2">
+            <a:schemeClr val="dk1">
+              <a:shade val="50000"/>
+            </a:schemeClr>
+          </a:lnRef>
+          <a:fillRef idx="1">
+            <a:schemeClr val="dk1"/>
+          </a:fillRef>
+          <a:effectRef idx="0">
+            <a:schemeClr val="dk1"/>
+          </a:effectRef>
+          <a:fontRef idx="minor">
+            <a:schemeClr val="lt1"/>
+          </a:fontRef>
+        </p:style>
+        <p:txBody>
+          <a:bodyPr rtlCol="0" anchor="ctr"/>
+          <a:lstStyle/>
+          <a:p>
+            <a:pPr algn="ctr"/>
+            <a:endParaRPr lang="en-US" sz="1400"/>
+          </a:p>
+        </p:txBody>
+      </p:sp>
+      <p:cxnSp>
+        <p:nvCxnSpPr>
+          <p:cNvPr id="21" name="Straight Arrow Connector 20"/>
+          <p:cNvCxnSpPr>
+            <a:cxnSpLocks/>
+            <a:endCxn id="12" idx="1"/>
+          </p:cNvCxnSpPr>
+          <p:nvPr/>
+        </p:nvCxnSpPr>
+        <p:spPr>
+          <a:xfrm flipV="1">
+            <a:off x="5316071" y="3473108"/>
+            <a:ext cx="779928" cy="256"/>
+          </a:xfrm>
+          <a:prstGeom prst="straightConnector1">
+            <a:avLst/>
+          </a:prstGeom>
+          <a:ln w="47625">
+            <a:tailEnd type="arrow"/>
+          </a:ln>
+        </p:spPr>
+        <p:style>
+          <a:lnRef idx="1">
+            <a:schemeClr val="accent1"/>
+          </a:lnRef>
+          <a:fillRef idx="0">
+            <a:schemeClr val="accent1"/>
+          </a:fillRef>
+          <a:effectRef idx="0">
+            <a:schemeClr val="accent1"/>
+          </a:effectRef>
+          <a:fontRef idx="minor">
+            <a:schemeClr val="tx1"/>
+          </a:fontRef>
+        </p:style>
+      </p:cxnSp>
+      <p:cxnSp>
+        <p:nvCxnSpPr>
+          <p:cNvPr id="22" name="Straight Arrow Connector 21"/>
+          <p:cNvCxnSpPr>
+            <a:cxnSpLocks/>
+            <a:stCxn id="12" idx="3"/>
+            <a:endCxn id="13" idx="1"/>
+          </p:cNvCxnSpPr>
+          <p:nvPr/>
+        </p:nvCxnSpPr>
+        <p:spPr>
+          <a:xfrm>
+            <a:off x="8390020" y="3473108"/>
+            <a:ext cx="701843" cy="0"/>
+          </a:xfrm>
+          <a:prstGeom prst="straightConnector1">
+            <a:avLst/>
+          </a:prstGeom>
+          <a:ln w="47625">
+            <a:tailEnd type="arrow"/>
+          </a:ln>
+        </p:spPr>
+        <p:style>
+          <a:lnRef idx="1">
+            <a:schemeClr val="accent1"/>
+          </a:lnRef>
+          <a:fillRef idx="0">
+            <a:schemeClr val="accent1"/>
+          </a:fillRef>
+          <a:effectRef idx="0">
+            <a:schemeClr val="accent1"/>
+          </a:effectRef>
+          <a:fontRef idx="minor">
+            <a:schemeClr val="tx1"/>
+          </a:fontRef>
+        </p:style>
+      </p:cxnSp>
+      <p:sp>
+        <p:nvSpPr>
+          <p:cNvPr id="23" name="Rounded Rectangle 22"/>
+          <p:cNvSpPr/>
+          <p:nvPr/>
+        </p:nvSpPr>
+        <p:spPr>
+          <a:xfrm>
+            <a:off x="6095999" y="2198871"/>
+            <a:ext cx="2294021" cy="493858"/>
+          </a:xfrm>
+          <a:prstGeom prst="roundRect">
+            <a:avLst>
+              <a:gd name="adj" fmla="val 9358"/>
+            </a:avLst>
+          </a:prstGeom>
+          <a:solidFill>
+            <a:schemeClr val="accent1">
+              <a:lumMod val="40000"/>
+              <a:lumOff val="60000"/>
+            </a:schemeClr>
+          </a:solidFill>
+        </p:spPr>
+        <p:style>
+          <a:lnRef idx="2">
+            <a:schemeClr val="accent1">
+              <a:shade val="50000"/>
+            </a:schemeClr>
+          </a:lnRef>
+          <a:fillRef idx="1">
+            <a:schemeClr val="accent1"/>
+          </a:fillRef>
+          <a:effectRef idx="0">
+            <a:schemeClr val="accent1"/>
+          </a:effectRef>
+          <a:fontRef idx="minor">
+            <a:schemeClr val="lt1"/>
+          </a:fontRef>
+        </p:style>
+        <p:txBody>
+          <a:bodyPr rtlCol="0" anchor="ctr"/>
+          <a:lstStyle/>
+          <a:p>
+            <a:pPr algn="ctr"/>
+            <a:r>
+              <a:rPr lang="en-US" sz="1200">
+                <a:solidFill>
+                  <a:schemeClr val="tx1"/>
+                </a:solidFill>
+                <a:hlinkClick r:id="rId3" action="ppaction://hlinkfile"/>
+              </a:rPr>
+              <a:t>OpenAI Chat API</a:t>
+            </a:r>
+          </a:p>
+        </p:txBody>
+      </p:sp>
+      <p:pic>
+        <p:nvPicPr>
+          <p:cNvPr id="24" name="Picture 23"/>
+          <p:cNvPicPr>
+            <a:picLocks noChangeAspect="1"/>
+          </p:cNvPicPr>
+          <p:nvPr/>
+        </p:nvPicPr>
+        <p:blipFill>
+          <a:blip r:embed="rId4"/>
+          <a:stretch>
+            <a:fillRect/>
+          </a:stretch>
+        </p:blipFill>
+        <p:spPr>
+          <a:xfrm>
+            <a:off x="10053543" y="4022350"/>
+            <a:ext cx="1123225" cy="1034995"/>
+          </a:xfrm>
+          <a:prstGeom prst="rect">
+            <a:avLst/>
+          </a:prstGeom>
+        </p:spPr>
+      </p:pic>
+      <p:pic>
+        <p:nvPicPr>
+          <p:cNvPr id="25" name="Picture 24"/>
+          <p:cNvPicPr>
+            <a:picLocks noChangeAspect="1"/>
+          </p:cNvPicPr>
+          <p:nvPr/>
+        </p:nvPicPr>
+        <p:blipFill>
+          <a:blip r:embed="rId5">
+            <a:clrChange>
+              <a:clrFrom>
+                <a:srgbClr val="FFFFFF">
+                  <a:alpha val="100000"/>
+                </a:srgbClr>
+              </a:clrFrom>
+              <a:clrTo>
+                <a:srgbClr val="FFFFFF">
+                  <a:alpha val="100000"/>
+                  <a:alpha val="0"/>
+                </a:srgbClr>
+              </a:clrTo>
+            </a:clrChange>
+          </a:blip>
+          <a:stretch>
+            <a:fillRect/>
+          </a:stretch>
+        </p:blipFill>
+        <p:spPr>
+          <a:xfrm>
+            <a:off x="10799182" y="4483259"/>
+            <a:ext cx="494130" cy="341744"/>
+          </a:xfrm>
+          <a:prstGeom prst="rect">
+            <a:avLst/>
+          </a:prstGeom>
+        </p:spPr>
+      </p:pic>
+      <p:sp>
+        <p:nvSpPr>
+          <p:cNvPr id="27" name="Up Arrow 26"/>
+          <p:cNvSpPr/>
+          <p:nvPr/>
+        </p:nvSpPr>
+        <p:spPr>
+          <a:xfrm>
+            <a:off x="6915580" y="2723147"/>
+            <a:ext cx="634115" cy="258928"/>
+          </a:xfrm>
+          <a:prstGeom prst="upArrow">
+            <a:avLst/>
+          </a:prstGeom>
+          <a:solidFill>
+            <a:schemeClr val="tx1">
+              <a:lumMod val="65000"/>
+              <a:lumOff val="35000"/>
+            </a:schemeClr>
+          </a:solidFill>
+          <a:ln>
+            <a:noFill/>
+          </a:ln>
+        </p:spPr>
+        <p:style>
+          <a:lnRef idx="2">
+            <a:schemeClr val="dk1">
+              <a:shade val="50000"/>
+            </a:schemeClr>
+          </a:lnRef>
+          <a:fillRef idx="1">
+            <a:schemeClr val="dk1"/>
+          </a:fillRef>
+          <a:effectRef idx="0">
+            <a:schemeClr val="dk1"/>
+          </a:effectRef>
+          <a:fontRef idx="minor">
+            <a:schemeClr val="lt1"/>
+          </a:fontRef>
+        </p:style>
+        <p:txBody>
+          <a:bodyPr rtlCol="0" anchor="ctr"/>
+          <a:lstStyle/>
+          <a:p>
+            <a:pPr algn="ctr"/>
+            <a:endParaRPr lang="en-US" sz="1400"/>
           </a:p>
         </p:txBody>
       </p:sp>
       <p:grpSp>
         <p:nvGrpSpPr>
-          <p:cNvPr id="3" name="Group 2">
+          <p:cNvPr id="31" name="Group 30">
             <a:extLst>
               <a:ext uri="{FF2B5EF4-FFF2-40B4-BE49-F238E27FC236}">
-                <a16:creationId xmlns:a16="http://schemas.microsoft.com/office/drawing/2014/main" id="{D7738DF7-E2BE-A675-FC43-A3DB09BD5551}"/>
+                <a16:creationId xmlns:a16="http://schemas.microsoft.com/office/drawing/2014/main" id="{BF0DE2EE-15EC-E0CB-A164-EE473E1216C0}"/>
               </a:ext>
             </a:extLst>
           </p:cNvPr>
@@ -3604,642 +4319,12 @@
         </p:nvGrpSpPr>
         <p:grpSpPr>
           <a:xfrm>
-            <a:off x="2910674" y="2251309"/>
-            <a:ext cx="8423074" cy="2870133"/>
-            <a:chOff x="1174115" y="2030730"/>
-            <a:chExt cx="9590405" cy="3546475"/>
+            <a:off x="4821820" y="4274862"/>
+            <a:ext cx="5047807" cy="356647"/>
+            <a:chOff x="4098457" y="4199565"/>
+            <a:chExt cx="5771170" cy="356647"/>
           </a:xfrm>
         </p:grpSpPr>
-        <p:sp>
-          <p:nvSpPr>
-            <p:cNvPr id="26" name="Rectangles 25"/>
-            <p:cNvSpPr/>
-            <p:nvPr/>
-          </p:nvSpPr>
-          <p:spPr>
-            <a:xfrm>
-              <a:off x="1174115" y="4234180"/>
-              <a:ext cx="9590405" cy="1217930"/>
-            </a:xfrm>
-            <a:prstGeom prst="rect">
-              <a:avLst/>
-            </a:prstGeom>
-            <a:solidFill>
-              <a:schemeClr val="accent1">
-                <a:lumMod val="20000"/>
-                <a:lumOff val="80000"/>
-              </a:schemeClr>
-            </a:solidFill>
-          </p:spPr>
-          <p:style>
-            <a:lnRef idx="2">
-              <a:schemeClr val="accent1">
-                <a:shade val="50000"/>
-              </a:schemeClr>
-            </a:lnRef>
-            <a:fillRef idx="1">
-              <a:schemeClr val="accent1"/>
-            </a:fillRef>
-            <a:effectRef idx="0">
-              <a:schemeClr val="accent1"/>
-            </a:effectRef>
-            <a:fontRef idx="minor">
-              <a:schemeClr val="lt1"/>
-            </a:fontRef>
-          </p:style>
-          <p:txBody>
-            <a:bodyPr rtlCol="0" anchor="ctr"/>
-            <a:lstStyle/>
-            <a:p>
-              <a:pPr algn="ctr"/>
-              <a:endParaRPr lang="en-US" sz="1400"/>
-            </a:p>
-          </p:txBody>
-        </p:sp>
-        <p:sp>
-          <p:nvSpPr>
-            <p:cNvPr id="4" name="Rectangles 3"/>
-            <p:cNvSpPr/>
-            <p:nvPr/>
-          </p:nvSpPr>
-          <p:spPr>
-            <a:xfrm>
-              <a:off x="1188085" y="3077845"/>
-              <a:ext cx="2724785" cy="925195"/>
-            </a:xfrm>
-            <a:prstGeom prst="rect">
-              <a:avLst/>
-            </a:prstGeom>
-            <a:solidFill>
-              <a:schemeClr val="accent1">
-                <a:lumMod val="20000"/>
-                <a:lumOff val="80000"/>
-              </a:schemeClr>
-            </a:solidFill>
-          </p:spPr>
-          <p:style>
-            <a:lnRef idx="2">
-              <a:schemeClr val="accent1">
-                <a:shade val="50000"/>
-              </a:schemeClr>
-            </a:lnRef>
-            <a:fillRef idx="1">
-              <a:schemeClr val="accent1"/>
-            </a:fillRef>
-            <a:effectRef idx="0">
-              <a:schemeClr val="accent1"/>
-            </a:effectRef>
-            <a:fontRef idx="minor">
-              <a:schemeClr val="lt1"/>
-            </a:fontRef>
-          </p:style>
-          <p:txBody>
-            <a:bodyPr rtlCol="0" anchor="ctr"/>
-            <a:lstStyle/>
-            <a:p>
-              <a:pPr algn="ctr"/>
-              <a:r>
-                <a:rPr lang="en-US" sz="1400" dirty="0">
-                  <a:solidFill>
-                    <a:schemeClr val="tx1"/>
-                  </a:solidFill>
-                  <a:cs typeface="+mn-lt"/>
-                </a:rPr>
-                <a:t>ASR(Auto Speech Recognition) Service</a:t>
-              </a:r>
-            </a:p>
-          </p:txBody>
-        </p:sp>
-        <p:sp>
-          <p:nvSpPr>
-            <p:cNvPr id="9" name="Rounded Rectangle 8"/>
-            <p:cNvSpPr/>
-            <p:nvPr/>
-          </p:nvSpPr>
-          <p:spPr>
-            <a:xfrm>
-              <a:off x="1798320" y="2030730"/>
-              <a:ext cx="1503680" cy="610235"/>
-            </a:xfrm>
-            <a:prstGeom prst="roundRect">
-              <a:avLst/>
-            </a:prstGeom>
-            <a:noFill/>
-            <a:extLst>
-              <a:ext uri="{909E8E84-426E-40DD-AFC4-6F175D3DCCD1}">
-                <a14:hiddenFill xmlns:a14="http://schemas.microsoft.com/office/drawing/2010/main">
-                  <a:solidFill>
-                    <a:schemeClr val="accent1"/>
-                  </a:solidFill>
-                </a14:hiddenFill>
-              </a:ext>
-            </a:extLst>
-          </p:spPr>
-          <p:style>
-            <a:lnRef idx="2">
-              <a:schemeClr val="accent1">
-                <a:shade val="50000"/>
-              </a:schemeClr>
-            </a:lnRef>
-            <a:fillRef idx="1">
-              <a:schemeClr val="accent1"/>
-            </a:fillRef>
-            <a:effectRef idx="0">
-              <a:schemeClr val="accent1"/>
-            </a:effectRef>
-            <a:fontRef idx="minor">
-              <a:schemeClr val="lt1"/>
-            </a:fontRef>
-          </p:style>
-          <p:txBody>
-            <a:bodyPr rtlCol="0" anchor="ctr"/>
-            <a:lstStyle/>
-            <a:p>
-              <a:pPr algn="ctr"/>
-              <a:r>
-                <a:rPr lang="en-US" sz="1400">
-                  <a:solidFill>
-                    <a:schemeClr val="tx1"/>
-                  </a:solidFill>
-                  <a:hlinkClick r:id="rId2" action="ppaction://hlinkfile"/>
-                </a:rPr>
-                <a:t>OpenAI Speech API</a:t>
-              </a:r>
-            </a:p>
-          </p:txBody>
-        </p:sp>
-        <p:sp>
-          <p:nvSpPr>
-            <p:cNvPr id="11" name="Up Arrow 10"/>
-            <p:cNvSpPr/>
-            <p:nvPr/>
-          </p:nvSpPr>
-          <p:spPr>
-            <a:xfrm>
-              <a:off x="2188845" y="2771140"/>
-              <a:ext cx="721995" cy="162560"/>
-            </a:xfrm>
-            <a:prstGeom prst="upArrow">
-              <a:avLst/>
-            </a:prstGeom>
-          </p:spPr>
-          <p:style>
-            <a:lnRef idx="2">
-              <a:schemeClr val="dk1">
-                <a:shade val="50000"/>
-              </a:schemeClr>
-            </a:lnRef>
-            <a:fillRef idx="1">
-              <a:schemeClr val="dk1"/>
-            </a:fillRef>
-            <a:effectRef idx="0">
-              <a:schemeClr val="dk1"/>
-            </a:effectRef>
-            <a:fontRef idx="minor">
-              <a:schemeClr val="lt1"/>
-            </a:fontRef>
-          </p:style>
-          <p:txBody>
-            <a:bodyPr rtlCol="0" anchor="ctr"/>
-            <a:lstStyle/>
-            <a:p>
-              <a:pPr algn="ctr"/>
-              <a:endParaRPr lang="en-US" sz="1400"/>
-            </a:p>
-          </p:txBody>
-        </p:sp>
-        <p:sp>
-          <p:nvSpPr>
-            <p:cNvPr id="12" name="Rectangles 11"/>
-            <p:cNvSpPr/>
-            <p:nvPr/>
-          </p:nvSpPr>
-          <p:spPr>
-            <a:xfrm>
-              <a:off x="4733925" y="3077845"/>
-              <a:ext cx="2724785" cy="925195"/>
-            </a:xfrm>
-            <a:prstGeom prst="rect">
-              <a:avLst/>
-            </a:prstGeom>
-            <a:solidFill>
-              <a:schemeClr val="accent1">
-                <a:lumMod val="20000"/>
-                <a:lumOff val="80000"/>
-              </a:schemeClr>
-            </a:solidFill>
-          </p:spPr>
-          <p:style>
-            <a:lnRef idx="2">
-              <a:schemeClr val="accent1">
-                <a:shade val="50000"/>
-              </a:schemeClr>
-            </a:lnRef>
-            <a:fillRef idx="1">
-              <a:schemeClr val="accent1"/>
-            </a:fillRef>
-            <a:effectRef idx="0">
-              <a:schemeClr val="accent1"/>
-            </a:effectRef>
-            <a:fontRef idx="minor">
-              <a:schemeClr val="lt1"/>
-            </a:fontRef>
-          </p:style>
-          <p:txBody>
-            <a:bodyPr rtlCol="0" anchor="ctr"/>
-            <a:lstStyle/>
-            <a:p>
-              <a:pPr algn="ctr"/>
-              <a:r>
-                <a:rPr lang="en-US" sz="1400">
-                  <a:solidFill>
-                    <a:schemeClr val="tx1"/>
-                  </a:solidFill>
-                  <a:cs typeface="+mn-lt"/>
-                </a:rPr>
-                <a:t>LLM Service</a:t>
-              </a:r>
-            </a:p>
-          </p:txBody>
-        </p:sp>
-        <p:sp>
-          <p:nvSpPr>
-            <p:cNvPr id="13" name="Rectangles 12"/>
-            <p:cNvSpPr/>
-            <p:nvPr/>
-          </p:nvSpPr>
-          <p:spPr>
-            <a:xfrm>
-              <a:off x="8038465" y="3077845"/>
-              <a:ext cx="2724785" cy="925195"/>
-            </a:xfrm>
-            <a:prstGeom prst="rect">
-              <a:avLst/>
-            </a:prstGeom>
-            <a:solidFill>
-              <a:schemeClr val="accent1">
-                <a:lumMod val="20000"/>
-                <a:lumOff val="80000"/>
-              </a:schemeClr>
-            </a:solidFill>
-          </p:spPr>
-          <p:style>
-            <a:lnRef idx="2">
-              <a:schemeClr val="accent1">
-                <a:shade val="50000"/>
-              </a:schemeClr>
-            </a:lnRef>
-            <a:fillRef idx="1">
-              <a:schemeClr val="accent1"/>
-            </a:fillRef>
-            <a:effectRef idx="0">
-              <a:schemeClr val="accent1"/>
-            </a:effectRef>
-            <a:fontRef idx="minor">
-              <a:schemeClr val="lt1"/>
-            </a:fontRef>
-          </p:style>
-          <p:txBody>
-            <a:bodyPr rtlCol="0" anchor="ctr"/>
-            <a:lstStyle/>
-            <a:p>
-              <a:pPr algn="ctr"/>
-              <a:r>
-                <a:rPr lang="en-US" sz="1400">
-                  <a:solidFill>
-                    <a:schemeClr val="tx1"/>
-                  </a:solidFill>
-                  <a:cs typeface="+mn-lt"/>
-                </a:rPr>
-                <a:t>TTS (Text To Speech) Service</a:t>
-              </a:r>
-            </a:p>
-          </p:txBody>
-        </p:sp>
-        <p:sp>
-          <p:nvSpPr>
-            <p:cNvPr id="15" name="Rounded Rectangle 14"/>
-            <p:cNvSpPr/>
-            <p:nvPr/>
-          </p:nvSpPr>
-          <p:spPr>
-            <a:xfrm>
-              <a:off x="8312150" y="2030730"/>
-              <a:ext cx="2174875" cy="610235"/>
-            </a:xfrm>
-            <a:prstGeom prst="roundRect">
-              <a:avLst/>
-            </a:prstGeom>
-            <a:noFill/>
-            <a:extLst>
-              <a:ext uri="{909E8E84-426E-40DD-AFC4-6F175D3DCCD1}">
-                <a14:hiddenFill xmlns:a14="http://schemas.microsoft.com/office/drawing/2010/main">
-                  <a:solidFill>
-                    <a:schemeClr val="accent1"/>
-                  </a:solidFill>
-                </a14:hiddenFill>
-              </a:ext>
-            </a:extLst>
-          </p:spPr>
-          <p:style>
-            <a:lnRef idx="2">
-              <a:schemeClr val="accent1">
-                <a:shade val="50000"/>
-              </a:schemeClr>
-            </a:lnRef>
-            <a:fillRef idx="1">
-              <a:schemeClr val="accent1"/>
-            </a:fillRef>
-            <a:effectRef idx="0">
-              <a:schemeClr val="accent1"/>
-            </a:effectRef>
-            <a:fontRef idx="minor">
-              <a:schemeClr val="lt1"/>
-            </a:fontRef>
-          </p:style>
-          <p:txBody>
-            <a:bodyPr rtlCol="0" anchor="ctr"/>
-            <a:lstStyle/>
-            <a:p>
-              <a:pPr algn="ctr"/>
-              <a:r>
-                <a:rPr lang="en-US" sz="1400">
-                  <a:solidFill>
-                    <a:schemeClr val="tx1"/>
-                  </a:solidFill>
-                  <a:hlinkClick r:id="rId2" action="ppaction://hlinkfile"/>
-                </a:rPr>
-                <a:t>OpenAI Transcriptions API</a:t>
-              </a:r>
-            </a:p>
-          </p:txBody>
-        </p:sp>
-        <p:sp>
-          <p:nvSpPr>
-            <p:cNvPr id="17" name="Up Arrow 16"/>
-            <p:cNvSpPr/>
-            <p:nvPr/>
-          </p:nvSpPr>
-          <p:spPr>
-            <a:xfrm>
-              <a:off x="9039225" y="2771140"/>
-              <a:ext cx="721995" cy="162560"/>
-            </a:xfrm>
-            <a:prstGeom prst="upArrow">
-              <a:avLst/>
-            </a:prstGeom>
-          </p:spPr>
-          <p:style>
-            <a:lnRef idx="2">
-              <a:schemeClr val="dk1">
-                <a:shade val="50000"/>
-              </a:schemeClr>
-            </a:lnRef>
-            <a:fillRef idx="1">
-              <a:schemeClr val="dk1"/>
-            </a:fillRef>
-            <a:effectRef idx="0">
-              <a:schemeClr val="dk1"/>
-            </a:effectRef>
-            <a:fontRef idx="minor">
-              <a:schemeClr val="lt1"/>
-            </a:fontRef>
-          </p:style>
-          <p:txBody>
-            <a:bodyPr rtlCol="0" anchor="ctr"/>
-            <a:lstStyle/>
-            <a:p>
-              <a:pPr algn="ctr"/>
-              <a:endParaRPr lang="en-US" sz="1400"/>
-            </a:p>
-          </p:txBody>
-        </p:sp>
-        <p:cxnSp>
-          <p:nvCxnSpPr>
-            <p:cNvPr id="21" name="Straight Arrow Connector 20"/>
-            <p:cNvCxnSpPr/>
-            <p:nvPr/>
-          </p:nvCxnSpPr>
-          <p:spPr>
-            <a:xfrm>
-              <a:off x="3912870" y="3540760"/>
-              <a:ext cx="821055" cy="0"/>
-            </a:xfrm>
-            <a:prstGeom prst="straightConnector1">
-              <a:avLst/>
-            </a:prstGeom>
-            <a:ln w="47625">
-              <a:tailEnd type="arrow"/>
-            </a:ln>
-          </p:spPr>
-          <p:style>
-            <a:lnRef idx="1">
-              <a:schemeClr val="accent1"/>
-            </a:lnRef>
-            <a:fillRef idx="0">
-              <a:schemeClr val="accent1"/>
-            </a:fillRef>
-            <a:effectRef idx="0">
-              <a:schemeClr val="accent1"/>
-            </a:effectRef>
-            <a:fontRef idx="minor">
-              <a:schemeClr val="tx1"/>
-            </a:fontRef>
-          </p:style>
-        </p:cxnSp>
-        <p:cxnSp>
-          <p:nvCxnSpPr>
-            <p:cNvPr id="22" name="Straight Arrow Connector 21"/>
-            <p:cNvCxnSpPr/>
-            <p:nvPr/>
-          </p:nvCxnSpPr>
-          <p:spPr>
-            <a:xfrm>
-              <a:off x="7458710" y="3540760"/>
-              <a:ext cx="579755" cy="0"/>
-            </a:xfrm>
-            <a:prstGeom prst="straightConnector1">
-              <a:avLst/>
-            </a:prstGeom>
-            <a:ln w="47625">
-              <a:tailEnd type="arrow"/>
-            </a:ln>
-          </p:spPr>
-          <p:style>
-            <a:lnRef idx="1">
-              <a:schemeClr val="accent1"/>
-            </a:lnRef>
-            <a:fillRef idx="0">
-              <a:schemeClr val="accent1"/>
-            </a:fillRef>
-            <a:effectRef idx="0">
-              <a:schemeClr val="accent1"/>
-            </a:effectRef>
-            <a:fontRef idx="minor">
-              <a:schemeClr val="tx1"/>
-            </a:fontRef>
-          </p:style>
-        </p:cxnSp>
-        <p:sp>
-          <p:nvSpPr>
-            <p:cNvPr id="23" name="Rounded Rectangle 22"/>
-            <p:cNvSpPr/>
-            <p:nvPr/>
-          </p:nvSpPr>
-          <p:spPr>
-            <a:xfrm>
-              <a:off x="5342890" y="2030730"/>
-              <a:ext cx="1503680" cy="610235"/>
-            </a:xfrm>
-            <a:prstGeom prst="roundRect">
-              <a:avLst/>
-            </a:prstGeom>
-            <a:noFill/>
-            <a:extLst>
-              <a:ext uri="{909E8E84-426E-40DD-AFC4-6F175D3DCCD1}">
-                <a14:hiddenFill xmlns:a14="http://schemas.microsoft.com/office/drawing/2010/main">
-                  <a:solidFill>
-                    <a:schemeClr val="accent1"/>
-                  </a:solidFill>
-                </a14:hiddenFill>
-              </a:ext>
-            </a:extLst>
-          </p:spPr>
-          <p:style>
-            <a:lnRef idx="2">
-              <a:schemeClr val="accent1">
-                <a:shade val="50000"/>
-              </a:schemeClr>
-            </a:lnRef>
-            <a:fillRef idx="1">
-              <a:schemeClr val="accent1"/>
-            </a:fillRef>
-            <a:effectRef idx="0">
-              <a:schemeClr val="accent1"/>
-            </a:effectRef>
-            <a:fontRef idx="minor">
-              <a:schemeClr val="lt1"/>
-            </a:fontRef>
-          </p:style>
-          <p:txBody>
-            <a:bodyPr rtlCol="0" anchor="ctr"/>
-            <a:lstStyle/>
-            <a:p>
-              <a:pPr algn="ctr"/>
-              <a:r>
-                <a:rPr lang="en-US" sz="1400">
-                  <a:solidFill>
-                    <a:schemeClr val="tx1"/>
-                  </a:solidFill>
-                  <a:hlinkClick r:id="rId3" action="ppaction://hlinkfile"/>
-                </a:rPr>
-                <a:t>OpenAI Chat API</a:t>
-              </a:r>
-            </a:p>
-          </p:txBody>
-        </p:sp>
-        <p:pic>
-          <p:nvPicPr>
-            <p:cNvPr id="24" name="Picture 23"/>
-            <p:cNvPicPr>
-              <a:picLocks noChangeAspect="1"/>
-            </p:cNvPicPr>
-            <p:nvPr/>
-          </p:nvPicPr>
-          <p:blipFill>
-            <a:blip r:embed="rId4"/>
-            <a:stretch>
-              <a:fillRect/>
-            </a:stretch>
-          </p:blipFill>
-          <p:spPr>
-            <a:xfrm>
-              <a:off x="9285605" y="4298315"/>
-              <a:ext cx="1278890" cy="1278890"/>
-            </a:xfrm>
-            <a:prstGeom prst="rect">
-              <a:avLst/>
-            </a:prstGeom>
-          </p:spPr>
-        </p:pic>
-        <p:pic>
-          <p:nvPicPr>
-            <p:cNvPr id="25" name="Picture 24"/>
-            <p:cNvPicPr>
-              <a:picLocks noChangeAspect="1"/>
-            </p:cNvPicPr>
-            <p:nvPr/>
-          </p:nvPicPr>
-          <p:blipFill>
-            <a:blip r:embed="rId5">
-              <a:clrChange>
-                <a:clrFrom>
-                  <a:srgbClr val="FFFFFF">
-                    <a:alpha val="100000"/>
-                  </a:srgbClr>
-                </a:clrFrom>
-                <a:clrTo>
-                  <a:srgbClr val="FFFFFF">
-                    <a:alpha val="100000"/>
-                    <a:alpha val="0"/>
-                  </a:srgbClr>
-                </a:clrTo>
-              </a:clrChange>
-            </a:blip>
-            <a:stretch>
-              <a:fillRect/>
-            </a:stretch>
-          </p:blipFill>
-          <p:spPr>
-            <a:xfrm>
-              <a:off x="10126345" y="4900295"/>
-              <a:ext cx="562610" cy="422275"/>
-            </a:xfrm>
-            <a:prstGeom prst="rect">
-              <a:avLst/>
-            </a:prstGeom>
-          </p:spPr>
-        </p:pic>
-        <p:sp>
-          <p:nvSpPr>
-            <p:cNvPr id="27" name="Up Arrow 26"/>
-            <p:cNvSpPr/>
-            <p:nvPr/>
-          </p:nvSpPr>
-          <p:spPr>
-            <a:xfrm>
-              <a:off x="5734050" y="2771140"/>
-              <a:ext cx="721995" cy="162560"/>
-            </a:xfrm>
-            <a:prstGeom prst="upArrow">
-              <a:avLst/>
-            </a:prstGeom>
-          </p:spPr>
-          <p:style>
-            <a:lnRef idx="2">
-              <a:schemeClr val="dk1">
-                <a:shade val="50000"/>
-              </a:schemeClr>
-            </a:lnRef>
-            <a:fillRef idx="1">
-              <a:schemeClr val="dk1"/>
-            </a:fillRef>
-            <a:effectRef idx="0">
-              <a:schemeClr val="dk1"/>
-            </a:effectRef>
-            <a:fontRef idx="minor">
-              <a:schemeClr val="lt1"/>
-            </a:fontRef>
-          </p:style>
-          <p:txBody>
-            <a:bodyPr rtlCol="0" anchor="ctr"/>
-            <a:lstStyle/>
-            <a:p>
-              <a:pPr algn="ctr"/>
-              <a:endParaRPr lang="en-US" sz="1400"/>
-            </a:p>
-          </p:txBody>
-        </p:sp>
         <p:sp>
           <p:nvSpPr>
             <p:cNvPr id="28" name="Rectangles 27"/>
@@ -4248,14 +4333,22 @@
           </p:nvSpPr>
           <p:spPr>
             <a:xfrm>
-              <a:off x="2533650" y="4618990"/>
-              <a:ext cx="1859280" cy="433070"/>
+              <a:off x="4098457" y="4199565"/>
+              <a:ext cx="1632971" cy="350480"/>
             </a:xfrm>
             <a:prstGeom prst="rect">
               <a:avLst/>
             </a:prstGeom>
+            <a:solidFill>
+              <a:schemeClr val="accent1">
+                <a:lumMod val="40000"/>
+                <a:lumOff val="60000"/>
+              </a:schemeClr>
+            </a:solidFill>
             <a:ln>
-              <a:noFill/>
+              <a:solidFill>
+                <a:schemeClr val="accent1"/>
+              </a:solidFill>
             </a:ln>
           </p:spPr>
           <p:style>
@@ -4280,7 +4373,7 @@
             <a:p>
               <a:pPr algn="ctr"/>
               <a:r>
-                <a:rPr lang="en-US" sz="1400">
+                <a:rPr lang="en-US" sz="1200">
                   <a:solidFill>
                     <a:schemeClr val="tx1"/>
                   </a:solidFill>
@@ -4298,14 +4391,22 @@
           </p:nvSpPr>
           <p:spPr>
             <a:xfrm>
-              <a:off x="4889500" y="4618990"/>
-              <a:ext cx="1859280" cy="433070"/>
+              <a:off x="6167556" y="4199565"/>
+              <a:ext cx="1632971" cy="350480"/>
             </a:xfrm>
             <a:prstGeom prst="rect">
               <a:avLst/>
             </a:prstGeom>
+            <a:solidFill>
+              <a:schemeClr val="accent1">
+                <a:lumMod val="40000"/>
+                <a:lumOff val="60000"/>
+              </a:schemeClr>
+            </a:solidFill>
             <a:ln>
-              <a:noFill/>
+              <a:solidFill>
+                <a:schemeClr val="accent1"/>
+              </a:solidFill>
             </a:ln>
           </p:spPr>
           <p:style>
@@ -4330,7 +4431,7 @@
             <a:p>
               <a:pPr algn="ctr"/>
               <a:r>
-                <a:rPr lang="en-US" sz="1400">
+                <a:rPr lang="en-US" sz="1200">
                   <a:solidFill>
                     <a:schemeClr val="tx1"/>
                   </a:solidFill>
@@ -4348,14 +4449,22 @@
           </p:nvSpPr>
           <p:spPr>
             <a:xfrm>
-              <a:off x="7245350" y="4626610"/>
-              <a:ext cx="1859280" cy="433070"/>
+              <a:off x="8236656" y="4205732"/>
+              <a:ext cx="1632971" cy="350480"/>
             </a:xfrm>
             <a:prstGeom prst="rect">
               <a:avLst/>
             </a:prstGeom>
+            <a:solidFill>
+              <a:schemeClr val="accent1">
+                <a:lumMod val="40000"/>
+                <a:lumOff val="60000"/>
+              </a:schemeClr>
+            </a:solidFill>
             <a:ln>
-              <a:noFill/>
+              <a:solidFill>
+                <a:schemeClr val="accent1"/>
+              </a:solidFill>
             </a:ln>
           </p:spPr>
           <p:style>
@@ -4380,7 +4489,7 @@
             <a:p>
               <a:pPr algn="ctr"/>
               <a:r>
-                <a:rPr lang="en-US" sz="1400">
+                <a:rPr lang="en-US" sz="1200">
                   <a:solidFill>
                     <a:schemeClr val="tx1"/>
                   </a:solidFill>
@@ -4413,7 +4522,7 @@
         </p:blipFill>
         <p:spPr>
           <a:xfrm>
-            <a:off x="422368" y="2887714"/>
+            <a:off x="533676" y="1677875"/>
             <a:ext cx="1778830" cy="1352327"/>
           </a:xfrm>
           <a:prstGeom prst="rect">
@@ -4435,24 +4544,33 @@
         </p:nvSpPr>
         <p:spPr>
           <a:xfrm>
-            <a:off x="2455792" y="3334464"/>
+            <a:off x="2505311" y="2140543"/>
             <a:ext cx="212558" cy="372978"/>
           </a:xfrm>
           <a:prstGeom prst="rightArrow">
             <a:avLst/>
           </a:prstGeom>
+          <a:solidFill>
+            <a:schemeClr val="tx1">
+              <a:lumMod val="65000"/>
+              <a:lumOff val="35000"/>
+            </a:schemeClr>
+          </a:solidFill>
+          <a:ln>
+            <a:noFill/>
+          </a:ln>
         </p:spPr>
         <p:style>
           <a:lnRef idx="2">
-            <a:schemeClr val="accent1">
-              <a:shade val="15000"/>
+            <a:schemeClr val="dk1">
+              <a:shade val="50000"/>
             </a:schemeClr>
           </a:lnRef>
           <a:fillRef idx="1">
-            <a:schemeClr val="accent1"/>
+            <a:schemeClr val="dk1"/>
           </a:fillRef>
           <a:effectRef idx="0">
-            <a:schemeClr val="accent1"/>
+            <a:schemeClr val="dk1"/>
           </a:effectRef>
           <a:fontRef idx="minor">
             <a:schemeClr val="lt1"/>
@@ -4463,7 +4581,7 @@
           <a:lstStyle/>
           <a:p>
             <a:pPr algn="ctr"/>
-            <a:endParaRPr lang="zh-CN" altLang="en-US"/>
+            <a:endParaRPr lang="zh-CN" altLang="en-US" sz="1400"/>
           </a:p>
         </p:txBody>
       </p:sp>
@@ -4481,7 +4599,7 @@
         </p:nvSpPr>
         <p:spPr>
           <a:xfrm>
-            <a:off x="600037" y="4265847"/>
+            <a:off x="711345" y="3056008"/>
             <a:ext cx="1423492" cy="307777"/>
           </a:xfrm>
           <a:prstGeom prst="rect">
@@ -4645,6 +4763,80 @@
           </a:extLst>
         </p:spPr>
       </p:pic>
+      <p:sp>
+        <p:nvSpPr>
+          <p:cNvPr id="16" name="TextBox 15">
+            <a:extLst>
+              <a:ext uri="{FF2B5EF4-FFF2-40B4-BE49-F238E27FC236}">
+                <a16:creationId xmlns:a16="http://schemas.microsoft.com/office/drawing/2014/main" id="{D2E5FD42-8322-1BA9-B5AC-907998CDE26C}"/>
+              </a:ext>
+            </a:extLst>
+          </p:cNvPr>
+          <p:cNvSpPr txBox="1"/>
+          <p:nvPr/>
+        </p:nvSpPr>
+        <p:spPr>
+          <a:xfrm>
+            <a:off x="6387579" y="1771211"/>
+            <a:ext cx="1774085" cy="369332"/>
+          </a:xfrm>
+          <a:prstGeom prst="rect">
+            <a:avLst/>
+          </a:prstGeom>
+          <a:noFill/>
+        </p:spPr>
+        <p:txBody>
+          <a:bodyPr wrap="square" rtlCol="0">
+            <a:spAutoFit/>
+          </a:bodyPr>
+          <a:lstStyle/>
+          <a:p>
+            <a:pPr algn="ctr"/>
+            <a:r>
+              <a:rPr lang="en-US" altLang="zh-CN" dirty="0"/>
+              <a:t>API Gateway</a:t>
+            </a:r>
+            <a:endParaRPr lang="zh-CN" altLang="en-US" dirty="0"/>
+          </a:p>
+        </p:txBody>
+      </p:sp>
+      <p:sp>
+        <p:nvSpPr>
+          <p:cNvPr id="32" name="TextBox 31">
+            <a:extLst>
+              <a:ext uri="{FF2B5EF4-FFF2-40B4-BE49-F238E27FC236}">
+                <a16:creationId xmlns:a16="http://schemas.microsoft.com/office/drawing/2014/main" id="{5D0B036D-EFC9-0CBD-CFD8-75368349D5BD}"/>
+              </a:ext>
+            </a:extLst>
+          </p:cNvPr>
+          <p:cNvSpPr txBox="1"/>
+          <p:nvPr/>
+        </p:nvSpPr>
+        <p:spPr>
+          <a:xfrm>
+            <a:off x="2937941" y="4144537"/>
+            <a:ext cx="1774085" cy="646331"/>
+          </a:xfrm>
+          <a:prstGeom prst="rect">
+            <a:avLst/>
+          </a:prstGeom>
+          <a:noFill/>
+        </p:spPr>
+        <p:txBody>
+          <a:bodyPr wrap="square" rtlCol="0">
+            <a:spAutoFit/>
+          </a:bodyPr>
+          <a:lstStyle/>
+          <a:p>
+            <a:pPr algn="ctr"/>
+            <a:r>
+              <a:rPr lang="en-US" altLang="zh-CN" dirty="0"/>
+              <a:t>Optimized AI Server</a:t>
+            </a:r>
+            <a:endParaRPr lang="zh-CN" altLang="en-US" dirty="0"/>
+          </a:p>
+        </p:txBody>
+      </p:sp>
     </p:spTree>
   </p:cSld>
   <p:clrMapOvr>
@@ -4672,32 +4864,10 @@
       </p:grpSpPr>
       <p:sp>
         <p:nvSpPr>
-          <p:cNvPr id="2" name="Title 1"/>
-          <p:cNvSpPr>
-            <a:spLocks noGrp="1"/>
-          </p:cNvSpPr>
-          <p:nvPr>
-            <p:ph type="title"/>
-          </p:nvPr>
-        </p:nvSpPr>
-        <p:spPr/>
-        <p:txBody>
-          <a:bodyPr/>
-          <a:lstStyle/>
-          <a:p>
-            <a:r>
-              <a:rPr lang="en-US" altLang="zh-CN"/>
-              <a:t>Meeting Summary Pipeline</a:t>
-            </a:r>
-          </a:p>
-        </p:txBody>
-      </p:sp>
-      <p:sp>
-        <p:nvSpPr>
-          <p:cNvPr id="4" name="Rectangles 25">
+          <p:cNvPr id="35" name="Rectangles 3">
             <a:extLst>
               <a:ext uri="{FF2B5EF4-FFF2-40B4-BE49-F238E27FC236}">
-                <a16:creationId xmlns:a16="http://schemas.microsoft.com/office/drawing/2014/main" id="{BF7AE19A-74B0-1E84-0E5B-FCD2BF2BB49A}"/>
+                <a16:creationId xmlns:a16="http://schemas.microsoft.com/office/drawing/2014/main" id="{98FFD4AD-AA41-B07B-75A0-EB3187D9742E}"/>
               </a:ext>
             </a:extLst>
           </p:cNvPr>
@@ -4706,8 +4876,8 @@
         </p:nvSpPr>
         <p:spPr>
           <a:xfrm>
-            <a:off x="2910674" y="4034543"/>
-            <a:ext cx="8423074" cy="985661"/>
+            <a:off x="2910674" y="1767713"/>
+            <a:ext cx="8421959" cy="1065849"/>
           </a:xfrm>
           <a:prstGeom prst="rect">
             <a:avLst/>
@@ -4740,16 +4910,80 @@
           <a:lstStyle/>
           <a:p>
             <a:pPr algn="ctr"/>
-            <a:endParaRPr lang="en-US" sz="1400"/>
-          </a:p>
-        </p:txBody>
-      </p:sp>
-      <p:sp>
-        <p:nvSpPr>
-          <p:cNvPr id="5" name="Rectangles 3">
+            <a:endParaRPr lang="en-US" sz="1400" dirty="0">
+              <a:solidFill>
+                <a:schemeClr val="tx1"/>
+              </a:solidFill>
+              <a:cs typeface="+mn-lt"/>
+            </a:endParaRPr>
+          </a:p>
+        </p:txBody>
+      </p:sp>
+      <p:sp>
+        <p:nvSpPr>
+          <p:cNvPr id="36" name="TextBox 35">
             <a:extLst>
               <a:ext uri="{FF2B5EF4-FFF2-40B4-BE49-F238E27FC236}">
-                <a16:creationId xmlns:a16="http://schemas.microsoft.com/office/drawing/2014/main" id="{4CBEB16A-7EEE-5023-9C4A-0200DEC65500}"/>
+                <a16:creationId xmlns:a16="http://schemas.microsoft.com/office/drawing/2014/main" id="{0488A6BF-414A-295D-BC9F-41400BE03AF0}"/>
+              </a:ext>
+            </a:extLst>
+          </p:cNvPr>
+          <p:cNvSpPr txBox="1"/>
+          <p:nvPr/>
+        </p:nvSpPr>
+        <p:spPr>
+          <a:xfrm>
+            <a:off x="6387579" y="1771211"/>
+            <a:ext cx="1774085" cy="369332"/>
+          </a:xfrm>
+          <a:prstGeom prst="rect">
+            <a:avLst/>
+          </a:prstGeom>
+          <a:noFill/>
+        </p:spPr>
+        <p:txBody>
+          <a:bodyPr wrap="square" rtlCol="0">
+            <a:spAutoFit/>
+          </a:bodyPr>
+          <a:lstStyle/>
+          <a:p>
+            <a:pPr algn="ctr"/>
+            <a:r>
+              <a:rPr lang="en-US" altLang="zh-CN" dirty="0"/>
+              <a:t>API Gateway</a:t>
+            </a:r>
+            <a:endParaRPr lang="zh-CN" altLang="en-US" dirty="0"/>
+          </a:p>
+        </p:txBody>
+      </p:sp>
+      <p:sp>
+        <p:nvSpPr>
+          <p:cNvPr id="2" name="Title 1"/>
+          <p:cNvSpPr>
+            <a:spLocks noGrp="1"/>
+          </p:cNvSpPr>
+          <p:nvPr>
+            <p:ph type="title"/>
+          </p:nvPr>
+        </p:nvSpPr>
+        <p:spPr/>
+        <p:txBody>
+          <a:bodyPr/>
+          <a:lstStyle/>
+          <a:p>
+            <a:r>
+              <a:rPr lang="en-US" altLang="zh-CN"/>
+              <a:t>Meeting Summary Pipeline</a:t>
+            </a:r>
+          </a:p>
+        </p:txBody>
+      </p:sp>
+      <p:sp>
+        <p:nvSpPr>
+          <p:cNvPr id="6" name="Rounded Rectangle 8">
+            <a:extLst>
+              <a:ext uri="{FF2B5EF4-FFF2-40B4-BE49-F238E27FC236}">
+                <a16:creationId xmlns:a16="http://schemas.microsoft.com/office/drawing/2014/main" id="{1EAE6DBF-8A59-08C9-63BC-CECD964B636E}"/>
               </a:ext>
             </a:extLst>
           </p:cNvPr>
@@ -4758,18 +4992,24 @@
         </p:nvSpPr>
         <p:spPr>
           <a:xfrm>
-            <a:off x="2922944" y="3098731"/>
-            <a:ext cx="1671382" cy="748753"/>
-          </a:xfrm>
-          <a:prstGeom prst="rect">
-            <a:avLst/>
+            <a:off x="3164304" y="2200088"/>
+            <a:ext cx="1561256" cy="466246"/>
+          </a:xfrm>
+          <a:prstGeom prst="roundRect">
+            <a:avLst>
+              <a:gd name="adj" fmla="val 6756"/>
+            </a:avLst>
           </a:prstGeom>
-          <a:solidFill>
-            <a:schemeClr val="accent1">
-              <a:lumMod val="20000"/>
-              <a:lumOff val="80000"/>
-            </a:schemeClr>
-          </a:solidFill>
+          <a:noFill/>
+          <a:extLst>
+            <a:ext uri="{909E8E84-426E-40DD-AFC4-6F175D3DCCD1}">
+              <a14:hiddenFill xmlns:a14="http://schemas.microsoft.com/office/drawing/2010/main">
+                <a:solidFill>
+                  <a:schemeClr val="accent1"/>
+                </a:solidFill>
+              </a14:hiddenFill>
+            </a:ext>
+          </a:extLst>
         </p:spPr>
         <p:style>
           <a:lnRef idx="2">
@@ -4793,35 +5033,23 @@
           <a:p>
             <a:pPr algn="ctr"/>
             <a:r>
-              <a:rPr lang="en-US" sz="1400" dirty="0">
+              <a:rPr lang="en-US" sz="1200" dirty="0">
                 <a:solidFill>
                   <a:schemeClr val="tx1"/>
                 </a:solidFill>
-                <a:cs typeface="+mn-lt"/>
+                <a:hlinkClick r:id="rId2" action="ppaction://hlinkfile"/>
               </a:rPr>
-              <a:t>ASR + Segments + diarize</a:t>
-            </a:r>
-          </a:p>
-          <a:p>
-            <a:pPr algn="ctr"/>
-            <a:r>
-              <a:rPr lang="en-US" sz="1400" dirty="0">
-                <a:solidFill>
-                  <a:schemeClr val="tx1"/>
-                </a:solidFill>
-                <a:cs typeface="+mn-lt"/>
-              </a:rPr>
-              <a:t>(WhisperX)</a:t>
-            </a:r>
-          </a:p>
-        </p:txBody>
-      </p:sp>
-      <p:sp>
-        <p:nvSpPr>
-          <p:cNvPr id="6" name="Rounded Rectangle 8">
+              <a:t>OpenAI Speech API + Speakers</a:t>
+            </a:r>
+          </a:p>
+        </p:txBody>
+      </p:sp>
+      <p:sp>
+        <p:nvSpPr>
+          <p:cNvPr id="7" name="Up Arrow 10">
             <a:extLst>
               <a:ext uri="{FF2B5EF4-FFF2-40B4-BE49-F238E27FC236}">
-                <a16:creationId xmlns:a16="http://schemas.microsoft.com/office/drawing/2014/main" id="{1EAE6DBF-8A59-08C9-63BC-CECD964B636E}"/>
+                <a16:creationId xmlns:a16="http://schemas.microsoft.com/office/drawing/2014/main" id="{0F3B0181-C94E-474D-7747-ED29C01B62FA}"/>
               </a:ext>
             </a:extLst>
           </p:cNvPr>
@@ -4830,12 +5058,67 @@
         </p:nvSpPr>
         <p:spPr>
           <a:xfrm>
-            <a:off x="2922944" y="1913936"/>
-            <a:ext cx="1671381" cy="838430"/>
+            <a:off x="3627874" y="2688372"/>
+            <a:ext cx="634115" cy="324592"/>
+          </a:xfrm>
+          <a:prstGeom prst="upArrow">
+            <a:avLst/>
+          </a:prstGeom>
+          <a:solidFill>
+            <a:schemeClr val="tx1">
+              <a:lumMod val="65000"/>
+              <a:lumOff val="35000"/>
+            </a:schemeClr>
+          </a:solidFill>
+          <a:ln>
+            <a:noFill/>
+          </a:ln>
+        </p:spPr>
+        <p:style>
+          <a:lnRef idx="2">
+            <a:schemeClr val="dk1">
+              <a:shade val="50000"/>
+            </a:schemeClr>
+          </a:lnRef>
+          <a:fillRef idx="1">
+            <a:schemeClr val="dk1"/>
+          </a:fillRef>
+          <a:effectRef idx="0">
+            <a:schemeClr val="dk1"/>
+          </a:effectRef>
+          <a:fontRef idx="minor">
+            <a:schemeClr val="lt1"/>
+          </a:fontRef>
+        </p:style>
+        <p:txBody>
+          <a:bodyPr rtlCol="0" anchor="ctr"/>
+          <a:lstStyle/>
+          <a:p>
+            <a:pPr algn="ctr"/>
+            <a:endParaRPr lang="en-US" sz="1400"/>
+          </a:p>
+        </p:txBody>
+      </p:sp>
+      <p:sp>
+        <p:nvSpPr>
+          <p:cNvPr id="14" name="Rounded Rectangle 22">
+            <a:extLst>
+              <a:ext uri="{FF2B5EF4-FFF2-40B4-BE49-F238E27FC236}">
+                <a16:creationId xmlns:a16="http://schemas.microsoft.com/office/drawing/2014/main" id="{8B126116-065E-72D9-E0D8-11BFC163835E}"/>
+              </a:ext>
+            </a:extLst>
+          </p:cNvPr>
+          <p:cNvSpPr/>
+          <p:nvPr/>
+        </p:nvSpPr>
+        <p:spPr>
+          <a:xfrm>
+            <a:off x="7294302" y="2202404"/>
+            <a:ext cx="1561257" cy="428118"/>
           </a:xfrm>
           <a:prstGeom prst="roundRect">
             <a:avLst>
-              <a:gd name="adj" fmla="val 6756"/>
+              <a:gd name="adj" fmla="val 9115"/>
             </a:avLst>
           </a:prstGeom>
           <a:noFill/>
@@ -4871,23 +5154,23 @@
           <a:p>
             <a:pPr algn="ctr"/>
             <a:r>
-              <a:rPr lang="en-US" sz="1400" dirty="0">
+              <a:rPr lang="en-US" sz="1200" dirty="0">
                 <a:solidFill>
                   <a:schemeClr val="tx1"/>
                 </a:solidFill>
-                <a:hlinkClick r:id="rId2" action="ppaction://hlinkfile"/>
+                <a:hlinkClick r:id="rId3" action="ppaction://hlinkfile"/>
               </a:rPr>
-              <a:t>OpenAI Speech API + Speakers</a:t>
-            </a:r>
-          </a:p>
-        </p:txBody>
-      </p:sp>
-      <p:sp>
-        <p:nvSpPr>
-          <p:cNvPr id="7" name="Up Arrow 10">
+              <a:t>OpenAI Chat API</a:t>
+            </a:r>
+          </a:p>
+        </p:txBody>
+      </p:sp>
+      <p:sp>
+        <p:nvSpPr>
+          <p:cNvPr id="17" name="Up Arrow 26">
             <a:extLst>
               <a:ext uri="{FF2B5EF4-FFF2-40B4-BE49-F238E27FC236}">
-                <a16:creationId xmlns:a16="http://schemas.microsoft.com/office/drawing/2014/main" id="{0F3B0181-C94E-474D-7747-ED29C01B62FA}"/>
+                <a16:creationId xmlns:a16="http://schemas.microsoft.com/office/drawing/2014/main" id="{62280E40-22A5-7CE2-513E-3FFB0B62A32A}"/>
               </a:ext>
             </a:extLst>
           </p:cNvPr>
@@ -4896,12 +5179,21 @@
         </p:nvSpPr>
         <p:spPr>
           <a:xfrm>
-            <a:off x="3479745" y="2850517"/>
-            <a:ext cx="634115" cy="131558"/>
+            <a:off x="7757872" y="2666334"/>
+            <a:ext cx="634115" cy="334527"/>
           </a:xfrm>
           <a:prstGeom prst="upArrow">
             <a:avLst/>
           </a:prstGeom>
+          <a:solidFill>
+            <a:schemeClr val="tx1">
+              <a:lumMod val="65000"/>
+              <a:lumOff val="35000"/>
+            </a:schemeClr>
+          </a:solidFill>
+          <a:ln>
+            <a:noFill/>
+          </a:ln>
         </p:spPr>
         <p:style>
           <a:lnRef idx="2">
@@ -4928,12 +5220,42 @@
           </a:p>
         </p:txBody>
       </p:sp>
-      <p:sp>
-        <p:nvSpPr>
-          <p:cNvPr id="8" name="Rectangles 11">
+      <p:pic>
+        <p:nvPicPr>
+          <p:cNvPr id="21" name="Picture 20">
             <a:extLst>
               <a:ext uri="{FF2B5EF4-FFF2-40B4-BE49-F238E27FC236}">
-                <a16:creationId xmlns:a16="http://schemas.microsoft.com/office/drawing/2014/main" id="{558D9960-863D-7F89-DAB5-75916F86F9B1}"/>
+                <a16:creationId xmlns:a16="http://schemas.microsoft.com/office/drawing/2014/main" id="{6FD1BFCC-9AAE-55E6-C991-B0D768F6BC59}"/>
+              </a:ext>
+            </a:extLst>
+          </p:cNvPr>
+          <p:cNvPicPr>
+            <a:picLocks noChangeAspect="1"/>
+          </p:cNvPicPr>
+          <p:nvPr/>
+        </p:nvPicPr>
+        <p:blipFill>
+          <a:blip r:embed="rId4"/>
+          <a:stretch>
+            <a:fillRect/>
+          </a:stretch>
+        </p:blipFill>
+        <p:spPr>
+          <a:xfrm>
+            <a:off x="474182" y="1712630"/>
+            <a:ext cx="1778830" cy="1352327"/>
+          </a:xfrm>
+          <a:prstGeom prst="rect">
+            <a:avLst/>
+          </a:prstGeom>
+        </p:spPr>
+      </p:pic>
+      <p:sp>
+        <p:nvSpPr>
+          <p:cNvPr id="22" name="Arrow: Right 21">
+            <a:extLst>
+              <a:ext uri="{FF2B5EF4-FFF2-40B4-BE49-F238E27FC236}">
+                <a16:creationId xmlns:a16="http://schemas.microsoft.com/office/drawing/2014/main" id="{B7E1A32C-E2AE-CFBD-6962-AADC3E5B4C57}"/>
               </a:ext>
             </a:extLst>
           </p:cNvPr>
@@ -4942,8 +5264,100 @@
         </p:nvSpPr>
         <p:spPr>
           <a:xfrm>
-            <a:off x="7344260" y="3098731"/>
-            <a:ext cx="1671382" cy="748753"/>
+            <a:off x="2507606" y="2159380"/>
+            <a:ext cx="212558" cy="372978"/>
+          </a:xfrm>
+          <a:prstGeom prst="rightArrow">
+            <a:avLst/>
+          </a:prstGeom>
+          <a:solidFill>
+            <a:schemeClr val="tx1">
+              <a:lumMod val="65000"/>
+              <a:lumOff val="35000"/>
+            </a:schemeClr>
+          </a:solidFill>
+          <a:ln>
+            <a:noFill/>
+          </a:ln>
+        </p:spPr>
+        <p:style>
+          <a:lnRef idx="2">
+            <a:schemeClr val="accent1">
+              <a:shade val="15000"/>
+            </a:schemeClr>
+          </a:lnRef>
+          <a:fillRef idx="1">
+            <a:schemeClr val="accent1"/>
+          </a:fillRef>
+          <a:effectRef idx="0">
+            <a:schemeClr val="accent1"/>
+          </a:effectRef>
+          <a:fontRef idx="minor">
+            <a:schemeClr val="lt1"/>
+          </a:fontRef>
+        </p:style>
+        <p:txBody>
+          <a:bodyPr rtlCol="0" anchor="ctr"/>
+          <a:lstStyle/>
+          <a:p>
+            <a:pPr algn="ctr"/>
+            <a:endParaRPr lang="zh-CN" altLang="en-US"/>
+          </a:p>
+        </p:txBody>
+      </p:sp>
+      <p:sp>
+        <p:nvSpPr>
+          <p:cNvPr id="23" name="TextBox 22">
+            <a:extLst>
+              <a:ext uri="{FF2B5EF4-FFF2-40B4-BE49-F238E27FC236}">
+                <a16:creationId xmlns:a16="http://schemas.microsoft.com/office/drawing/2014/main" id="{35BCBFA6-CB87-3910-CF37-F1F0B0A9CAF1}"/>
+              </a:ext>
+            </a:extLst>
+          </p:cNvPr>
+          <p:cNvSpPr txBox="1"/>
+          <p:nvPr/>
+        </p:nvSpPr>
+        <p:spPr>
+          <a:xfrm>
+            <a:off x="647700" y="3039690"/>
+            <a:ext cx="1423492" cy="307777"/>
+          </a:xfrm>
+          <a:prstGeom prst="rect">
+            <a:avLst/>
+          </a:prstGeom>
+          <a:noFill/>
+        </p:spPr>
+        <p:txBody>
+          <a:bodyPr wrap="square" rtlCol="0">
+            <a:spAutoFit/>
+          </a:bodyPr>
+          <a:lstStyle/>
+          <a:p>
+            <a:pPr algn="ctr"/>
+            <a:r>
+              <a:rPr lang="en-US" altLang="zh-CN" sz="1400" dirty="0"/>
+              <a:t>Audio Input</a:t>
+            </a:r>
+            <a:endParaRPr lang="zh-CN" altLang="en-US" sz="1400" dirty="0"/>
+          </a:p>
+        </p:txBody>
+      </p:sp>
+      <p:sp>
+        <p:nvSpPr>
+          <p:cNvPr id="5" name="Rectangles 3">
+            <a:extLst>
+              <a:ext uri="{FF2B5EF4-FFF2-40B4-BE49-F238E27FC236}">
+                <a16:creationId xmlns:a16="http://schemas.microsoft.com/office/drawing/2014/main" id="{4CBEB16A-7EEE-5023-9C4A-0200DEC65500}"/>
+              </a:ext>
+            </a:extLst>
+          </p:cNvPr>
+          <p:cNvSpPr/>
+          <p:nvPr/>
+        </p:nvSpPr>
+        <p:spPr>
+          <a:xfrm>
+            <a:off x="3164304" y="3098731"/>
+            <a:ext cx="1561256" cy="748753"/>
           </a:xfrm>
           <a:prstGeom prst="rect">
             <a:avLst/>
@@ -4977,23 +5391,35 @@
           <a:p>
             <a:pPr algn="ctr"/>
             <a:r>
-              <a:rPr lang="en-US" sz="1400">
+              <a:rPr lang="en-US" sz="1400" dirty="0">
                 <a:solidFill>
                   <a:schemeClr val="tx1"/>
                 </a:solidFill>
                 <a:cs typeface="+mn-lt"/>
               </a:rPr>
-              <a:t>LLM Service</a:t>
-            </a:r>
-          </a:p>
-        </p:txBody>
-      </p:sp>
-      <p:sp>
-        <p:nvSpPr>
-          <p:cNvPr id="9" name="Rectangles 12">
+              <a:t>ASR + Segments + diarize</a:t>
+            </a:r>
+          </a:p>
+          <a:p>
+            <a:pPr algn="ctr"/>
+            <a:r>
+              <a:rPr lang="en-US" sz="1400" dirty="0">
+                <a:solidFill>
+                  <a:schemeClr val="tx1"/>
+                </a:solidFill>
+                <a:cs typeface="+mn-lt"/>
+              </a:rPr>
+              <a:t>(WhisperX)</a:t>
+            </a:r>
+          </a:p>
+        </p:txBody>
+      </p:sp>
+      <p:sp>
+        <p:nvSpPr>
+          <p:cNvPr id="8" name="Rectangles 11">
             <a:extLst>
               <a:ext uri="{FF2B5EF4-FFF2-40B4-BE49-F238E27FC236}">
-                <a16:creationId xmlns:a16="http://schemas.microsoft.com/office/drawing/2014/main" id="{0AD68103-CF77-2584-C0C3-81448C269063}"/>
+                <a16:creationId xmlns:a16="http://schemas.microsoft.com/office/drawing/2014/main" id="{558D9960-863D-7F89-DAB5-75916F86F9B1}"/>
               </a:ext>
             </a:extLst>
           </p:cNvPr>
@@ -5002,8 +5428,8 @@
         </p:nvSpPr>
         <p:spPr>
           <a:xfrm>
-            <a:off x="9554918" y="3098731"/>
-            <a:ext cx="1778830" cy="748753"/>
+            <a:off x="7294302" y="3098731"/>
+            <a:ext cx="1561256" cy="748753"/>
           </a:xfrm>
           <a:prstGeom prst="rect">
             <a:avLst/>
@@ -5037,32 +5463,23 @@
           <a:p>
             <a:pPr algn="ctr"/>
             <a:r>
-              <a:rPr lang="en-US" altLang="zh-CN" sz="1400" dirty="0">
+              <a:rPr lang="en-US" sz="1400">
                 <a:solidFill>
                   <a:schemeClr val="tx1"/>
                 </a:solidFill>
                 <a:cs typeface="+mn-lt"/>
               </a:rPr>
-              <a:t>Mail </a:t>
-            </a:r>
-            <a:r>
-              <a:rPr lang="en-US" sz="1400" dirty="0">
-                <a:solidFill>
-                  <a:schemeClr val="tx1"/>
-                </a:solidFill>
-                <a:cs typeface="+mn-lt"/>
-              </a:rPr>
-              <a:t>Service</a:t>
-            </a:r>
-          </a:p>
-        </p:txBody>
-      </p:sp>
-      <p:sp>
-        <p:nvSpPr>
-          <p:cNvPr id="14" name="Rounded Rectangle 22">
+              <a:t>LLM Service</a:t>
+            </a:r>
+          </a:p>
+        </p:txBody>
+      </p:sp>
+      <p:sp>
+        <p:nvSpPr>
+          <p:cNvPr id="9" name="Rectangles 12">
             <a:extLst>
               <a:ext uri="{FF2B5EF4-FFF2-40B4-BE49-F238E27FC236}">
-                <a16:creationId xmlns:a16="http://schemas.microsoft.com/office/drawing/2014/main" id="{8B126116-065E-72D9-E0D8-11BFC163835E}"/>
+                <a16:creationId xmlns:a16="http://schemas.microsoft.com/office/drawing/2014/main" id="{0AD68103-CF77-2584-C0C3-81448C269063}"/>
               </a:ext>
             </a:extLst>
           </p:cNvPr>
@@ -5071,24 +5488,18 @@
         </p:nvSpPr>
         <p:spPr>
           <a:xfrm>
-            <a:off x="7344259" y="1902630"/>
-            <a:ext cx="1671381" cy="849736"/>
-          </a:xfrm>
-          <a:prstGeom prst="roundRect">
-            <a:avLst>
-              <a:gd name="adj" fmla="val 9115"/>
-            </a:avLst>
+            <a:off x="9359301" y="3098731"/>
+            <a:ext cx="1661624" cy="748753"/>
+          </a:xfrm>
+          <a:prstGeom prst="rect">
+            <a:avLst/>
           </a:prstGeom>
-          <a:noFill/>
-          <a:extLst>
-            <a:ext uri="{909E8E84-426E-40DD-AFC4-6F175D3DCCD1}">
-              <a14:hiddenFill xmlns:a14="http://schemas.microsoft.com/office/drawing/2010/main">
-                <a:solidFill>
-                  <a:schemeClr val="accent1"/>
-                </a:solidFill>
-              </a14:hiddenFill>
-            </a:ext>
-          </a:extLst>
+          <a:solidFill>
+            <a:schemeClr val="accent1">
+              <a:lumMod val="20000"/>
+              <a:lumOff val="80000"/>
+            </a:schemeClr>
+          </a:solidFill>
         </p:spPr>
         <p:style>
           <a:lnRef idx="2">
@@ -5112,97 +5523,32 @@
           <a:p>
             <a:pPr algn="ctr"/>
             <a:r>
+              <a:rPr lang="en-US" altLang="zh-CN" sz="1400" dirty="0">
+                <a:solidFill>
+                  <a:schemeClr val="tx1"/>
+                </a:solidFill>
+                <a:cs typeface="+mn-lt"/>
+              </a:rPr>
+              <a:t>Mail </a:t>
+            </a:r>
+            <a:r>
               <a:rPr lang="en-US" sz="1400" dirty="0">
                 <a:solidFill>
                   <a:schemeClr val="tx1"/>
                 </a:solidFill>
-                <a:hlinkClick r:id="rId3" action="ppaction://hlinkfile"/>
+                <a:cs typeface="+mn-lt"/>
               </a:rPr>
-              <a:t>OpenAI Chat API</a:t>
-            </a:r>
-          </a:p>
-        </p:txBody>
-      </p:sp>
-      <p:pic>
-        <p:nvPicPr>
-          <p:cNvPr id="15" name="Picture 14">
+              <a:t>Service</a:t>
+            </a:r>
+          </a:p>
+        </p:txBody>
+      </p:sp>
+      <p:sp>
+        <p:nvSpPr>
+          <p:cNvPr id="24" name="Rectangles 3">
             <a:extLst>
               <a:ext uri="{FF2B5EF4-FFF2-40B4-BE49-F238E27FC236}">
-                <a16:creationId xmlns:a16="http://schemas.microsoft.com/office/drawing/2014/main" id="{8FA9502B-4037-609D-6B7B-27540E5A5A39}"/>
-              </a:ext>
-            </a:extLst>
-          </p:cNvPr>
-          <p:cNvPicPr>
-            <a:picLocks noChangeAspect="1"/>
-          </p:cNvPicPr>
-          <p:nvPr/>
-        </p:nvPicPr>
-        <p:blipFill>
-          <a:blip r:embed="rId4"/>
-          <a:stretch>
-            <a:fillRect/>
-          </a:stretch>
-        </p:blipFill>
-        <p:spPr>
-          <a:xfrm>
-            <a:off x="10034845" y="4086447"/>
-            <a:ext cx="1123225" cy="1034995"/>
-          </a:xfrm>
-          <a:prstGeom prst="rect">
-            <a:avLst/>
-          </a:prstGeom>
-        </p:spPr>
-      </p:pic>
-      <p:pic>
-        <p:nvPicPr>
-          <p:cNvPr id="16" name="Picture 15">
-            <a:extLst>
-              <a:ext uri="{FF2B5EF4-FFF2-40B4-BE49-F238E27FC236}">
-                <a16:creationId xmlns:a16="http://schemas.microsoft.com/office/drawing/2014/main" id="{98D182A1-FD3E-252D-BF98-69FEE525FD46}"/>
-              </a:ext>
-            </a:extLst>
-          </p:cNvPr>
-          <p:cNvPicPr>
-            <a:picLocks noChangeAspect="1"/>
-          </p:cNvPicPr>
-          <p:nvPr/>
-        </p:nvPicPr>
-        <p:blipFill>
-          <a:blip r:embed="rId5">
-            <a:clrChange>
-              <a:clrFrom>
-                <a:srgbClr val="FFFFFF">
-                  <a:alpha val="100000"/>
-                </a:srgbClr>
-              </a:clrFrom>
-              <a:clrTo>
-                <a:srgbClr val="FFFFFF">
-                  <a:alpha val="100000"/>
-                  <a:alpha val="0"/>
-                </a:srgbClr>
-              </a:clrTo>
-            </a:clrChange>
-          </a:blip>
-          <a:stretch>
-            <a:fillRect/>
-          </a:stretch>
-        </p:blipFill>
-        <p:spPr>
-          <a:xfrm>
-            <a:off x="10773251" y="4573624"/>
-            <a:ext cx="494130" cy="341744"/>
-          </a:xfrm>
-          <a:prstGeom prst="rect">
-            <a:avLst/>
-          </a:prstGeom>
-        </p:spPr>
-      </p:pic>
-      <p:sp>
-        <p:nvSpPr>
-          <p:cNvPr id="17" name="Up Arrow 26">
-            <a:extLst>
-              <a:ext uri="{FF2B5EF4-FFF2-40B4-BE49-F238E27FC236}">
-                <a16:creationId xmlns:a16="http://schemas.microsoft.com/office/drawing/2014/main" id="{62280E40-22A5-7CE2-513E-3FFB0B62A32A}"/>
+                <a16:creationId xmlns:a16="http://schemas.microsoft.com/office/drawing/2014/main" id="{1D24CBC6-5BD5-7113-3BC6-EA823199F54D}"/>
               </a:ext>
             </a:extLst>
           </p:cNvPr>
@@ -5211,61 +5557,18 @@
         </p:nvSpPr>
         <p:spPr>
           <a:xfrm>
-            <a:off x="7925869" y="2845382"/>
-            <a:ext cx="634115" cy="131558"/>
-          </a:xfrm>
-          <a:prstGeom prst="upArrow">
-            <a:avLst/>
-          </a:prstGeom>
-        </p:spPr>
-        <p:style>
-          <a:lnRef idx="2">
-            <a:schemeClr val="dk1">
-              <a:shade val="50000"/>
-            </a:schemeClr>
-          </a:lnRef>
-          <a:fillRef idx="1">
-            <a:schemeClr val="dk1"/>
-          </a:fillRef>
-          <a:effectRef idx="0">
-            <a:schemeClr val="dk1"/>
-          </a:effectRef>
-          <a:fontRef idx="minor">
-            <a:schemeClr val="lt1"/>
-          </a:fontRef>
-        </p:style>
-        <p:txBody>
-          <a:bodyPr rtlCol="0" anchor="ctr"/>
-          <a:lstStyle/>
-          <a:p>
-            <a:pPr algn="ctr"/>
-            <a:endParaRPr lang="en-US" sz="1400"/>
-          </a:p>
-        </p:txBody>
-      </p:sp>
-      <p:sp>
-        <p:nvSpPr>
-          <p:cNvPr id="18" name="Rectangles 27">
-            <a:extLst>
-              <a:ext uri="{FF2B5EF4-FFF2-40B4-BE49-F238E27FC236}">
-                <a16:creationId xmlns:a16="http://schemas.microsoft.com/office/drawing/2014/main" id="{FC8B4B31-3B69-4B53-2899-5440A931A7EE}"/>
-              </a:ext>
-            </a:extLst>
-          </p:cNvPr>
-          <p:cNvSpPr/>
-          <p:nvPr/>
-        </p:nvSpPr>
-        <p:spPr>
-          <a:xfrm>
-            <a:off x="4104728" y="4345966"/>
-            <a:ext cx="1632971" cy="350480"/>
+            <a:off x="5229303" y="3098731"/>
+            <a:ext cx="1561256" cy="748753"/>
           </a:xfrm>
           <a:prstGeom prst="rect">
             <a:avLst/>
           </a:prstGeom>
-          <a:ln>
-            <a:noFill/>
-          </a:ln>
+          <a:solidFill>
+            <a:schemeClr val="accent1">
+              <a:lumMod val="20000"/>
+              <a:lumOff val="80000"/>
+            </a:schemeClr>
+          </a:solidFill>
         </p:spPr>
         <p:style>
           <a:lnRef idx="2">
@@ -5289,290 +5592,6 @@
           <a:p>
             <a:pPr algn="ctr"/>
             <a:r>
-              <a:rPr lang="en-US" sz="1400">
-                <a:solidFill>
-                  <a:schemeClr val="tx1"/>
-                </a:solidFill>
-              </a:rPr>
-              <a:t>OneAPI</a:t>
-            </a:r>
-          </a:p>
-        </p:txBody>
-      </p:sp>
-      <p:sp>
-        <p:nvSpPr>
-          <p:cNvPr id="19" name="Rectangles 28">
-            <a:extLst>
-              <a:ext uri="{FF2B5EF4-FFF2-40B4-BE49-F238E27FC236}">
-                <a16:creationId xmlns:a16="http://schemas.microsoft.com/office/drawing/2014/main" id="{7F05D637-BE86-EB28-2987-7462D70632BD}"/>
-              </a:ext>
-            </a:extLst>
-          </p:cNvPr>
-          <p:cNvSpPr/>
-          <p:nvPr/>
-        </p:nvSpPr>
-        <p:spPr>
-          <a:xfrm>
-            <a:off x="6173827" y="4345966"/>
-            <a:ext cx="1632971" cy="350480"/>
-          </a:xfrm>
-          <a:prstGeom prst="rect">
-            <a:avLst/>
-          </a:prstGeom>
-          <a:ln>
-            <a:noFill/>
-          </a:ln>
-        </p:spPr>
-        <p:style>
-          <a:lnRef idx="2">
-            <a:schemeClr val="accent1">
-              <a:shade val="50000"/>
-            </a:schemeClr>
-          </a:lnRef>
-          <a:fillRef idx="1">
-            <a:schemeClr val="accent1"/>
-          </a:fillRef>
-          <a:effectRef idx="0">
-            <a:schemeClr val="accent1"/>
-          </a:effectRef>
-          <a:fontRef idx="minor">
-            <a:schemeClr val="lt1"/>
-          </a:fontRef>
-        </p:style>
-        <p:txBody>
-          <a:bodyPr rtlCol="0" anchor="ctr"/>
-          <a:lstStyle/>
-          <a:p>
-            <a:pPr algn="ctr"/>
-            <a:r>
-              <a:rPr lang="en-US" sz="1400">
-                <a:solidFill>
-                  <a:schemeClr val="tx1"/>
-                </a:solidFill>
-              </a:rPr>
-              <a:t>IPEX</a:t>
-            </a:r>
-          </a:p>
-        </p:txBody>
-      </p:sp>
-      <p:sp>
-        <p:nvSpPr>
-          <p:cNvPr id="20" name="Rectangles 29">
-            <a:extLst>
-              <a:ext uri="{FF2B5EF4-FFF2-40B4-BE49-F238E27FC236}">
-                <a16:creationId xmlns:a16="http://schemas.microsoft.com/office/drawing/2014/main" id="{349E2C80-76A3-FA3D-C489-8B0938929151}"/>
-              </a:ext>
-            </a:extLst>
-          </p:cNvPr>
-          <p:cNvSpPr/>
-          <p:nvPr/>
-        </p:nvSpPr>
-        <p:spPr>
-          <a:xfrm>
-            <a:off x="8242927" y="4352133"/>
-            <a:ext cx="1632971" cy="350480"/>
-          </a:xfrm>
-          <a:prstGeom prst="rect">
-            <a:avLst/>
-          </a:prstGeom>
-          <a:ln>
-            <a:noFill/>
-          </a:ln>
-        </p:spPr>
-        <p:style>
-          <a:lnRef idx="2">
-            <a:schemeClr val="accent1">
-              <a:shade val="50000"/>
-            </a:schemeClr>
-          </a:lnRef>
-          <a:fillRef idx="1">
-            <a:schemeClr val="accent1"/>
-          </a:fillRef>
-          <a:effectRef idx="0">
-            <a:schemeClr val="accent1"/>
-          </a:effectRef>
-          <a:fontRef idx="minor">
-            <a:schemeClr val="lt1"/>
-          </a:fontRef>
-        </p:style>
-        <p:txBody>
-          <a:bodyPr rtlCol="0" anchor="ctr"/>
-          <a:lstStyle/>
-          <a:p>
-            <a:pPr algn="ctr"/>
-            <a:r>
-              <a:rPr lang="en-US" sz="1400">
-                <a:solidFill>
-                  <a:schemeClr val="tx1"/>
-                </a:solidFill>
-              </a:rPr>
-              <a:t>xFT</a:t>
-            </a:r>
-          </a:p>
-        </p:txBody>
-      </p:sp>
-      <p:pic>
-        <p:nvPicPr>
-          <p:cNvPr id="21" name="Picture 20">
-            <a:extLst>
-              <a:ext uri="{FF2B5EF4-FFF2-40B4-BE49-F238E27FC236}">
-                <a16:creationId xmlns:a16="http://schemas.microsoft.com/office/drawing/2014/main" id="{6FD1BFCC-9AAE-55E6-C991-B0D768F6BC59}"/>
-              </a:ext>
-            </a:extLst>
-          </p:cNvPr>
-          <p:cNvPicPr>
-            <a:picLocks noChangeAspect="1"/>
-          </p:cNvPicPr>
-          <p:nvPr/>
-        </p:nvPicPr>
-        <p:blipFill>
-          <a:blip r:embed="rId6"/>
-          <a:stretch>
-            <a:fillRect/>
-          </a:stretch>
-        </p:blipFill>
-        <p:spPr>
-          <a:xfrm>
-            <a:off x="422368" y="2887714"/>
-            <a:ext cx="1778830" cy="1352327"/>
-          </a:xfrm>
-          <a:prstGeom prst="rect">
-            <a:avLst/>
-          </a:prstGeom>
-        </p:spPr>
-      </p:pic>
-      <p:sp>
-        <p:nvSpPr>
-          <p:cNvPr id="22" name="Arrow: Right 21">
-            <a:extLst>
-              <a:ext uri="{FF2B5EF4-FFF2-40B4-BE49-F238E27FC236}">
-                <a16:creationId xmlns:a16="http://schemas.microsoft.com/office/drawing/2014/main" id="{B7E1A32C-E2AE-CFBD-6962-AADC3E5B4C57}"/>
-              </a:ext>
-            </a:extLst>
-          </p:cNvPr>
-          <p:cNvSpPr/>
-          <p:nvPr/>
-        </p:nvSpPr>
-        <p:spPr>
-          <a:xfrm>
-            <a:off x="2455792" y="3334464"/>
-            <a:ext cx="212558" cy="372978"/>
-          </a:xfrm>
-          <a:prstGeom prst="rightArrow">
-            <a:avLst/>
-          </a:prstGeom>
-        </p:spPr>
-        <p:style>
-          <a:lnRef idx="2">
-            <a:schemeClr val="accent1">
-              <a:shade val="15000"/>
-            </a:schemeClr>
-          </a:lnRef>
-          <a:fillRef idx="1">
-            <a:schemeClr val="accent1"/>
-          </a:fillRef>
-          <a:effectRef idx="0">
-            <a:schemeClr val="accent1"/>
-          </a:effectRef>
-          <a:fontRef idx="minor">
-            <a:schemeClr val="lt1"/>
-          </a:fontRef>
-        </p:style>
-        <p:txBody>
-          <a:bodyPr rtlCol="0" anchor="ctr"/>
-          <a:lstStyle/>
-          <a:p>
-            <a:pPr algn="ctr"/>
-            <a:endParaRPr lang="zh-CN" altLang="en-US"/>
-          </a:p>
-        </p:txBody>
-      </p:sp>
-      <p:sp>
-        <p:nvSpPr>
-          <p:cNvPr id="23" name="TextBox 22">
-            <a:extLst>
-              <a:ext uri="{FF2B5EF4-FFF2-40B4-BE49-F238E27FC236}">
-                <a16:creationId xmlns:a16="http://schemas.microsoft.com/office/drawing/2014/main" id="{35BCBFA6-CB87-3910-CF37-F1F0B0A9CAF1}"/>
-              </a:ext>
-            </a:extLst>
-          </p:cNvPr>
-          <p:cNvSpPr txBox="1"/>
-          <p:nvPr/>
-        </p:nvSpPr>
-        <p:spPr>
-          <a:xfrm>
-            <a:off x="600037" y="4265847"/>
-            <a:ext cx="1423492" cy="307777"/>
-          </a:xfrm>
-          <a:prstGeom prst="rect">
-            <a:avLst/>
-          </a:prstGeom>
-          <a:noFill/>
-        </p:spPr>
-        <p:txBody>
-          <a:bodyPr wrap="square" rtlCol="0">
-            <a:spAutoFit/>
-          </a:bodyPr>
-          <a:lstStyle/>
-          <a:p>
-            <a:pPr algn="ctr"/>
-            <a:r>
-              <a:rPr lang="en-US" altLang="zh-CN" sz="1400" dirty="0"/>
-              <a:t>Audio Input</a:t>
-            </a:r>
-            <a:endParaRPr lang="zh-CN" altLang="en-US" sz="1400" dirty="0"/>
-          </a:p>
-        </p:txBody>
-      </p:sp>
-      <p:sp>
-        <p:nvSpPr>
-          <p:cNvPr id="24" name="Rectangles 3">
-            <a:extLst>
-              <a:ext uri="{FF2B5EF4-FFF2-40B4-BE49-F238E27FC236}">
-                <a16:creationId xmlns:a16="http://schemas.microsoft.com/office/drawing/2014/main" id="{1D24CBC6-5BD5-7113-3BC6-EA823199F54D}"/>
-              </a:ext>
-            </a:extLst>
-          </p:cNvPr>
-          <p:cNvSpPr/>
-          <p:nvPr/>
-        </p:nvSpPr>
-        <p:spPr>
-          <a:xfrm>
-            <a:off x="5133602" y="3098731"/>
-            <a:ext cx="1671382" cy="748753"/>
-          </a:xfrm>
-          <a:prstGeom prst="rect">
-            <a:avLst/>
-          </a:prstGeom>
-          <a:solidFill>
-            <a:schemeClr val="accent1">
-              <a:lumMod val="20000"/>
-              <a:lumOff val="80000"/>
-            </a:schemeClr>
-          </a:solidFill>
-        </p:spPr>
-        <p:style>
-          <a:lnRef idx="2">
-            <a:schemeClr val="accent1">
-              <a:shade val="50000"/>
-            </a:schemeClr>
-          </a:lnRef>
-          <a:fillRef idx="1">
-            <a:schemeClr val="accent1"/>
-          </a:fillRef>
-          <a:effectRef idx="0">
-            <a:schemeClr val="accent1"/>
-          </a:effectRef>
-          <a:fontRef idx="minor">
-            <a:schemeClr val="lt1"/>
-          </a:fontRef>
-        </p:style>
-        <p:txBody>
-          <a:bodyPr rtlCol="0" anchor="ctr"/>
-          <a:lstStyle/>
-          <a:p>
-            <a:pPr algn="ctr"/>
-            <a:r>
               <a:rPr lang="en-US" sz="1400" dirty="0">
                 <a:solidFill>
                   <a:schemeClr val="tx1"/>
@@ -5601,8 +5620,8 @@
         </p:nvCxnSpPr>
         <p:spPr>
           <a:xfrm>
-            <a:off x="4594326" y="3473108"/>
-            <a:ext cx="539276" cy="0"/>
+            <a:off x="4725560" y="3473108"/>
+            <a:ext cx="503743" cy="0"/>
           </a:xfrm>
           <a:prstGeom prst="straightConnector1">
             <a:avLst/>
@@ -5643,8 +5662,8 @@
         </p:nvCxnSpPr>
         <p:spPr>
           <a:xfrm>
-            <a:off x="6804984" y="3473108"/>
-            <a:ext cx="539276" cy="0"/>
+            <a:off x="6790559" y="3473108"/>
+            <a:ext cx="503743" cy="0"/>
           </a:xfrm>
           <a:prstGeom prst="straightConnector1">
             <a:avLst/>
@@ -5686,8 +5705,8 @@
         </p:nvCxnSpPr>
         <p:spPr>
           <a:xfrm>
-            <a:off x="9015642" y="3473108"/>
-            <a:ext cx="539276" cy="0"/>
+            <a:off x="8855558" y="3473108"/>
+            <a:ext cx="503743" cy="0"/>
           </a:xfrm>
           <a:prstGeom prst="straightConnector1">
             <a:avLst/>
@@ -5726,7 +5745,7 @@
           <p:nvPr/>
         </p:nvPicPr>
         <p:blipFill>
-          <a:blip r:embed="rId7" cstate="print">
+          <a:blip r:embed="rId5" cstate="print">
             <a:extLst>
               <a:ext uri="{28A0092B-C50C-407E-A947-70E740481C1C}">
                 <a14:useLocalDpi xmlns:a14="http://schemas.microsoft.com/office/drawing/2010/main" val="0"/>
@@ -5740,7 +5759,7 @@
         </p:blipFill>
         <p:spPr bwMode="auto">
           <a:xfrm>
-            <a:off x="4287496" y="3517185"/>
+            <a:off x="4388923" y="3481983"/>
             <a:ext cx="517358" cy="517358"/>
           </a:xfrm>
           <a:prstGeom prst="rect">
@@ -5773,7 +5792,7 @@
           <p:nvPr/>
         </p:nvPicPr>
         <p:blipFill>
-          <a:blip r:embed="rId7" cstate="print">
+          <a:blip r:embed="rId5" cstate="print">
             <a:extLst>
               <a:ext uri="{28A0092B-C50C-407E-A947-70E740481C1C}">
                 <a14:useLocalDpi xmlns:a14="http://schemas.microsoft.com/office/drawing/2010/main" val="0"/>
@@ -5787,7 +5806,7 @@
         </p:blipFill>
         <p:spPr bwMode="auto">
           <a:xfrm>
-            <a:off x="6513338" y="3504850"/>
+            <a:off x="6415502" y="3500608"/>
             <a:ext cx="517358" cy="517358"/>
           </a:xfrm>
           <a:prstGeom prst="rect">
@@ -5820,7 +5839,7 @@
           <p:nvPr/>
         </p:nvPicPr>
         <p:blipFill>
-          <a:blip r:embed="rId7" cstate="print">
+          <a:blip r:embed="rId5" cstate="print">
             <a:extLst>
               <a:ext uri="{28A0092B-C50C-407E-A947-70E740481C1C}">
                 <a14:useLocalDpi xmlns:a14="http://schemas.microsoft.com/office/drawing/2010/main" val="0"/>
@@ -5834,7 +5853,7 @@
         </p:blipFill>
         <p:spPr bwMode="auto">
           <a:xfrm>
-            <a:off x="8739180" y="3495147"/>
+            <a:off x="8499043" y="3482954"/>
             <a:ext cx="517358" cy="517358"/>
           </a:xfrm>
           <a:prstGeom prst="rect">
@@ -5867,7 +5886,7 @@
           <p:nvPr/>
         </p:nvPicPr>
         <p:blipFill>
-          <a:blip r:embed="rId7" cstate="print">
+          <a:blip r:embed="rId5" cstate="print">
             <a:extLst>
               <a:ext uri="{28A0092B-C50C-407E-A947-70E740481C1C}">
                 <a14:useLocalDpi xmlns:a14="http://schemas.microsoft.com/office/drawing/2010/main" val="0"/>
@@ -5881,7 +5900,7 @@
         </p:blipFill>
         <p:spPr bwMode="auto">
           <a:xfrm>
-            <a:off x="11086028" y="3506809"/>
+            <a:off x="10706343" y="3482954"/>
             <a:ext cx="517358" cy="517358"/>
           </a:xfrm>
           <a:prstGeom prst="rect">
@@ -5899,6 +5918,382 @@
           </a:extLst>
         </p:spPr>
       </p:pic>
+      <p:sp>
+        <p:nvSpPr>
+          <p:cNvPr id="10" name="Rectangles 25">
+            <a:extLst>
+              <a:ext uri="{FF2B5EF4-FFF2-40B4-BE49-F238E27FC236}">
+                <a16:creationId xmlns:a16="http://schemas.microsoft.com/office/drawing/2014/main" id="{0385072D-A9B5-576F-1482-5958C2232D8F}"/>
+              </a:ext>
+            </a:extLst>
+          </p:cNvPr>
+          <p:cNvSpPr/>
+          <p:nvPr/>
+        </p:nvSpPr>
+        <p:spPr>
+          <a:xfrm>
+            <a:off x="2910674" y="4034543"/>
+            <a:ext cx="8423074" cy="866320"/>
+          </a:xfrm>
+          <a:prstGeom prst="rect">
+            <a:avLst/>
+          </a:prstGeom>
+          <a:solidFill>
+            <a:schemeClr val="accent1">
+              <a:lumMod val="20000"/>
+              <a:lumOff val="80000"/>
+            </a:schemeClr>
+          </a:solidFill>
+        </p:spPr>
+        <p:style>
+          <a:lnRef idx="2">
+            <a:schemeClr val="accent1">
+              <a:shade val="50000"/>
+            </a:schemeClr>
+          </a:lnRef>
+          <a:fillRef idx="1">
+            <a:schemeClr val="accent1"/>
+          </a:fillRef>
+          <a:effectRef idx="0">
+            <a:schemeClr val="accent1"/>
+          </a:effectRef>
+          <a:fontRef idx="minor">
+            <a:schemeClr val="lt1"/>
+          </a:fontRef>
+        </p:style>
+        <p:txBody>
+          <a:bodyPr rtlCol="0" anchor="ctr"/>
+          <a:lstStyle/>
+          <a:p>
+            <a:pPr algn="ctr"/>
+            <a:endParaRPr lang="en-US" sz="1400"/>
+          </a:p>
+        </p:txBody>
+      </p:sp>
+      <p:pic>
+        <p:nvPicPr>
+          <p:cNvPr id="11" name="Picture 10">
+            <a:extLst>
+              <a:ext uri="{FF2B5EF4-FFF2-40B4-BE49-F238E27FC236}">
+                <a16:creationId xmlns:a16="http://schemas.microsoft.com/office/drawing/2014/main" id="{58047B72-1E90-A0AC-CCEC-12B07C829A4A}"/>
+              </a:ext>
+            </a:extLst>
+          </p:cNvPr>
+          <p:cNvPicPr>
+            <a:picLocks noChangeAspect="1"/>
+          </p:cNvPicPr>
+          <p:nvPr/>
+        </p:nvPicPr>
+        <p:blipFill>
+          <a:blip r:embed="rId6"/>
+          <a:stretch>
+            <a:fillRect/>
+          </a:stretch>
+        </p:blipFill>
+        <p:spPr>
+          <a:xfrm>
+            <a:off x="10053543" y="4022350"/>
+            <a:ext cx="1123225" cy="1034995"/>
+          </a:xfrm>
+          <a:prstGeom prst="rect">
+            <a:avLst/>
+          </a:prstGeom>
+        </p:spPr>
+      </p:pic>
+      <p:pic>
+        <p:nvPicPr>
+          <p:cNvPr id="27" name="Picture 26">
+            <a:extLst>
+              <a:ext uri="{FF2B5EF4-FFF2-40B4-BE49-F238E27FC236}">
+                <a16:creationId xmlns:a16="http://schemas.microsoft.com/office/drawing/2014/main" id="{BD545B59-CF8D-BF88-F24F-8035F285F392}"/>
+              </a:ext>
+            </a:extLst>
+          </p:cNvPr>
+          <p:cNvPicPr>
+            <a:picLocks noChangeAspect="1"/>
+          </p:cNvPicPr>
+          <p:nvPr/>
+        </p:nvPicPr>
+        <p:blipFill>
+          <a:blip r:embed="rId7">
+            <a:clrChange>
+              <a:clrFrom>
+                <a:srgbClr val="FFFFFF">
+                  <a:alpha val="100000"/>
+                </a:srgbClr>
+              </a:clrFrom>
+              <a:clrTo>
+                <a:srgbClr val="FFFFFF">
+                  <a:alpha val="100000"/>
+                  <a:alpha val="0"/>
+                </a:srgbClr>
+              </a:clrTo>
+            </a:clrChange>
+          </a:blip>
+          <a:stretch>
+            <a:fillRect/>
+          </a:stretch>
+        </p:blipFill>
+        <p:spPr>
+          <a:xfrm>
+            <a:off x="10799182" y="4483259"/>
+            <a:ext cx="494130" cy="341744"/>
+          </a:xfrm>
+          <a:prstGeom prst="rect">
+            <a:avLst/>
+          </a:prstGeom>
+        </p:spPr>
+      </p:pic>
+      <p:grpSp>
+        <p:nvGrpSpPr>
+          <p:cNvPr id="29" name="Group 28">
+            <a:extLst>
+              <a:ext uri="{FF2B5EF4-FFF2-40B4-BE49-F238E27FC236}">
+                <a16:creationId xmlns:a16="http://schemas.microsoft.com/office/drawing/2014/main" id="{E08EC6A6-B985-87EC-EA4C-573503544516}"/>
+              </a:ext>
+            </a:extLst>
+          </p:cNvPr>
+          <p:cNvGrpSpPr/>
+          <p:nvPr/>
+        </p:nvGrpSpPr>
+        <p:grpSpPr>
+          <a:xfrm>
+            <a:off x="4821820" y="4274862"/>
+            <a:ext cx="5047807" cy="356647"/>
+            <a:chOff x="4098457" y="4199565"/>
+            <a:chExt cx="5771170" cy="356647"/>
+          </a:xfrm>
+        </p:grpSpPr>
+        <p:sp>
+          <p:nvSpPr>
+            <p:cNvPr id="31" name="Rectangles 27">
+              <a:extLst>
+                <a:ext uri="{FF2B5EF4-FFF2-40B4-BE49-F238E27FC236}">
+                  <a16:creationId xmlns:a16="http://schemas.microsoft.com/office/drawing/2014/main" id="{F5CF5275-E8BA-4B1F-D682-DC612E0E583D}"/>
+                </a:ext>
+              </a:extLst>
+            </p:cNvPr>
+            <p:cNvSpPr/>
+            <p:nvPr/>
+          </p:nvSpPr>
+          <p:spPr>
+            <a:xfrm>
+              <a:off x="4098457" y="4199565"/>
+              <a:ext cx="1632971" cy="350480"/>
+            </a:xfrm>
+            <a:prstGeom prst="rect">
+              <a:avLst/>
+            </a:prstGeom>
+            <a:solidFill>
+              <a:schemeClr val="accent1">
+                <a:lumMod val="40000"/>
+                <a:lumOff val="60000"/>
+              </a:schemeClr>
+            </a:solidFill>
+            <a:ln>
+              <a:solidFill>
+                <a:schemeClr val="accent1"/>
+              </a:solidFill>
+            </a:ln>
+          </p:spPr>
+          <p:style>
+            <a:lnRef idx="2">
+              <a:schemeClr val="accent1">
+                <a:shade val="50000"/>
+              </a:schemeClr>
+            </a:lnRef>
+            <a:fillRef idx="1">
+              <a:schemeClr val="accent1"/>
+            </a:fillRef>
+            <a:effectRef idx="0">
+              <a:schemeClr val="accent1"/>
+            </a:effectRef>
+            <a:fontRef idx="minor">
+              <a:schemeClr val="lt1"/>
+            </a:fontRef>
+          </p:style>
+          <p:txBody>
+            <a:bodyPr rtlCol="0" anchor="ctr"/>
+            <a:lstStyle/>
+            <a:p>
+              <a:pPr algn="ctr"/>
+              <a:r>
+                <a:rPr lang="en-US" sz="1200">
+                  <a:solidFill>
+                    <a:schemeClr val="tx1"/>
+                  </a:solidFill>
+                </a:rPr>
+                <a:t>OneAPI</a:t>
+              </a:r>
+            </a:p>
+          </p:txBody>
+        </p:sp>
+        <p:sp>
+          <p:nvSpPr>
+            <p:cNvPr id="32" name="Rectangles 28">
+              <a:extLst>
+                <a:ext uri="{FF2B5EF4-FFF2-40B4-BE49-F238E27FC236}">
+                  <a16:creationId xmlns:a16="http://schemas.microsoft.com/office/drawing/2014/main" id="{098E9B15-7E56-9449-AC38-39353AD49264}"/>
+                </a:ext>
+              </a:extLst>
+            </p:cNvPr>
+            <p:cNvSpPr/>
+            <p:nvPr/>
+          </p:nvSpPr>
+          <p:spPr>
+            <a:xfrm>
+              <a:off x="6167556" y="4199565"/>
+              <a:ext cx="1632971" cy="350480"/>
+            </a:xfrm>
+            <a:prstGeom prst="rect">
+              <a:avLst/>
+            </a:prstGeom>
+            <a:solidFill>
+              <a:schemeClr val="accent1">
+                <a:lumMod val="40000"/>
+                <a:lumOff val="60000"/>
+              </a:schemeClr>
+            </a:solidFill>
+            <a:ln>
+              <a:solidFill>
+                <a:schemeClr val="accent1"/>
+              </a:solidFill>
+            </a:ln>
+          </p:spPr>
+          <p:style>
+            <a:lnRef idx="2">
+              <a:schemeClr val="accent1">
+                <a:shade val="50000"/>
+              </a:schemeClr>
+            </a:lnRef>
+            <a:fillRef idx="1">
+              <a:schemeClr val="accent1"/>
+            </a:fillRef>
+            <a:effectRef idx="0">
+              <a:schemeClr val="accent1"/>
+            </a:effectRef>
+            <a:fontRef idx="minor">
+              <a:schemeClr val="lt1"/>
+            </a:fontRef>
+          </p:style>
+          <p:txBody>
+            <a:bodyPr rtlCol="0" anchor="ctr"/>
+            <a:lstStyle/>
+            <a:p>
+              <a:pPr algn="ctr"/>
+              <a:r>
+                <a:rPr lang="en-US" sz="1200">
+                  <a:solidFill>
+                    <a:schemeClr val="tx1"/>
+                  </a:solidFill>
+                </a:rPr>
+                <a:t>IPEX</a:t>
+              </a:r>
+            </a:p>
+          </p:txBody>
+        </p:sp>
+        <p:sp>
+          <p:nvSpPr>
+            <p:cNvPr id="33" name="Rectangles 29">
+              <a:extLst>
+                <a:ext uri="{FF2B5EF4-FFF2-40B4-BE49-F238E27FC236}">
+                  <a16:creationId xmlns:a16="http://schemas.microsoft.com/office/drawing/2014/main" id="{0A583432-1655-16C5-017E-113CD5BD31F7}"/>
+                </a:ext>
+              </a:extLst>
+            </p:cNvPr>
+            <p:cNvSpPr/>
+            <p:nvPr/>
+          </p:nvSpPr>
+          <p:spPr>
+            <a:xfrm>
+              <a:off x="8236656" y="4205732"/>
+              <a:ext cx="1632971" cy="350480"/>
+            </a:xfrm>
+            <a:prstGeom prst="rect">
+              <a:avLst/>
+            </a:prstGeom>
+            <a:solidFill>
+              <a:schemeClr val="accent1">
+                <a:lumMod val="40000"/>
+                <a:lumOff val="60000"/>
+              </a:schemeClr>
+            </a:solidFill>
+            <a:ln>
+              <a:solidFill>
+                <a:schemeClr val="accent1"/>
+              </a:solidFill>
+            </a:ln>
+          </p:spPr>
+          <p:style>
+            <a:lnRef idx="2">
+              <a:schemeClr val="accent1">
+                <a:shade val="50000"/>
+              </a:schemeClr>
+            </a:lnRef>
+            <a:fillRef idx="1">
+              <a:schemeClr val="accent1"/>
+            </a:fillRef>
+            <a:effectRef idx="0">
+              <a:schemeClr val="accent1"/>
+            </a:effectRef>
+            <a:fontRef idx="minor">
+              <a:schemeClr val="lt1"/>
+            </a:fontRef>
+          </p:style>
+          <p:txBody>
+            <a:bodyPr rtlCol="0" anchor="ctr"/>
+            <a:lstStyle/>
+            <a:p>
+              <a:pPr algn="ctr"/>
+              <a:r>
+                <a:rPr lang="en-US" sz="1200">
+                  <a:solidFill>
+                    <a:schemeClr val="tx1"/>
+                  </a:solidFill>
+                </a:rPr>
+                <a:t>xFT</a:t>
+              </a:r>
+            </a:p>
+          </p:txBody>
+        </p:sp>
+      </p:grpSp>
+      <p:sp>
+        <p:nvSpPr>
+          <p:cNvPr id="34" name="TextBox 33">
+            <a:extLst>
+              <a:ext uri="{FF2B5EF4-FFF2-40B4-BE49-F238E27FC236}">
+                <a16:creationId xmlns:a16="http://schemas.microsoft.com/office/drawing/2014/main" id="{B9E8EAA6-E03A-5FCE-59B1-FF1768A8D23F}"/>
+              </a:ext>
+            </a:extLst>
+          </p:cNvPr>
+          <p:cNvSpPr txBox="1"/>
+          <p:nvPr/>
+        </p:nvSpPr>
+        <p:spPr>
+          <a:xfrm>
+            <a:off x="2937941" y="4144537"/>
+            <a:ext cx="1774085" cy="646331"/>
+          </a:xfrm>
+          <a:prstGeom prst="rect">
+            <a:avLst/>
+          </a:prstGeom>
+          <a:noFill/>
+        </p:spPr>
+        <p:txBody>
+          <a:bodyPr wrap="square" rtlCol="0">
+            <a:spAutoFit/>
+          </a:bodyPr>
+          <a:lstStyle/>
+          <a:p>
+            <a:pPr algn="ctr"/>
+            <a:r>
+              <a:rPr lang="en-US" altLang="zh-CN" dirty="0"/>
+              <a:t>Optimized AI Server</a:t>
+            </a:r>
+            <a:endParaRPr lang="zh-CN" altLang="en-US" dirty="0"/>
+          </a:p>
+        </p:txBody>
+      </p:sp>
     </p:spTree>
   </p:cSld>
   <p:clrMapOvr>

</xml_diff>